<commit_message>
Included more slides in ppt
</commit_message>
<xml_diff>
--- a/Git and Github.pptx
+++ b/Git and Github.pptx
@@ -5,10 +5,10 @@
     <p:sldMasterId id="2147483648" r:id="rId4"/>
   </p:sldMasterIdLst>
   <p:notesMasterIdLst>
-    <p:notesMasterId r:id="rId36"/>
+    <p:notesMasterId r:id="rId38"/>
   </p:notesMasterIdLst>
   <p:handoutMasterIdLst>
-    <p:handoutMasterId r:id="rId37"/>
+    <p:handoutMasterId r:id="rId39"/>
   </p:handoutMasterIdLst>
   <p:sldIdLst>
     <p:sldId id="256" r:id="rId5"/>
@@ -16,32 +16,34 @@
     <p:sldId id="257" r:id="rId7"/>
     <p:sldId id="259" r:id="rId8"/>
     <p:sldId id="258" r:id="rId9"/>
-    <p:sldId id="270" r:id="rId10"/>
-    <p:sldId id="261" r:id="rId11"/>
-    <p:sldId id="264" r:id="rId12"/>
-    <p:sldId id="269" r:id="rId13"/>
-    <p:sldId id="280" r:id="rId14"/>
-    <p:sldId id="273" r:id="rId15"/>
-    <p:sldId id="282" r:id="rId16"/>
-    <p:sldId id="268" r:id="rId17"/>
-    <p:sldId id="267" r:id="rId18"/>
-    <p:sldId id="283" r:id="rId19"/>
-    <p:sldId id="275" r:id="rId20"/>
-    <p:sldId id="276" r:id="rId21"/>
-    <p:sldId id="277" r:id="rId22"/>
-    <p:sldId id="278" r:id="rId23"/>
-    <p:sldId id="279" r:id="rId24"/>
-    <p:sldId id="281" r:id="rId25"/>
-    <p:sldId id="286" r:id="rId26"/>
-    <p:sldId id="285" r:id="rId27"/>
-    <p:sldId id="284" r:id="rId28"/>
-    <p:sldId id="260" r:id="rId29"/>
-    <p:sldId id="262" r:id="rId30"/>
-    <p:sldId id="266" r:id="rId31"/>
-    <p:sldId id="265" r:id="rId32"/>
-    <p:sldId id="271" r:id="rId33"/>
-    <p:sldId id="274" r:id="rId34"/>
-    <p:sldId id="287" r:id="rId35"/>
+    <p:sldId id="261" r:id="rId10"/>
+    <p:sldId id="264" r:id="rId11"/>
+    <p:sldId id="269" r:id="rId12"/>
+    <p:sldId id="280" r:id="rId13"/>
+    <p:sldId id="273" r:id="rId14"/>
+    <p:sldId id="282" r:id="rId15"/>
+    <p:sldId id="288" r:id="rId16"/>
+    <p:sldId id="270" r:id="rId17"/>
+    <p:sldId id="268" r:id="rId18"/>
+    <p:sldId id="267" r:id="rId19"/>
+    <p:sldId id="283" r:id="rId20"/>
+    <p:sldId id="275" r:id="rId21"/>
+    <p:sldId id="276" r:id="rId22"/>
+    <p:sldId id="277" r:id="rId23"/>
+    <p:sldId id="289" r:id="rId24"/>
+    <p:sldId id="278" r:id="rId25"/>
+    <p:sldId id="279" r:id="rId26"/>
+    <p:sldId id="281" r:id="rId27"/>
+    <p:sldId id="286" r:id="rId28"/>
+    <p:sldId id="285" r:id="rId29"/>
+    <p:sldId id="284" r:id="rId30"/>
+    <p:sldId id="260" r:id="rId31"/>
+    <p:sldId id="262" r:id="rId32"/>
+    <p:sldId id="266" r:id="rId33"/>
+    <p:sldId id="265" r:id="rId34"/>
+    <p:sldId id="271" r:id="rId35"/>
+    <p:sldId id="274" r:id="rId36"/>
+    <p:sldId id="287" r:id="rId37"/>
   </p:sldIdLst>
   <p:sldSz cx="12192000" cy="6858000"/>
   <p:notesSz cx="6858000" cy="9144000"/>
@@ -256,7 +258,7 @@
           <a:p>
             <a:fld id="{33ADE46C-81A1-43FB-B8E4-2C816F921C1C}" type="datetimeFigureOut">
               <a:rPr lang="en-US" smtClean="0"/>
-              <a:t>8/9/2021</a:t>
+              <a:t>8/10/2021</a:t>
             </a:fld>
             <a:endParaRPr lang="en-US" dirty="0"/>
           </a:p>
@@ -433,7 +435,7 @@
           <a:p>
             <a:fld id="{1A32EB95-E92B-4DBE-A5E5-BAD87330878F}" type="datetimeFigureOut">
               <a:rPr lang="en-US" smtClean="0"/>
-              <a:t>8/9/2021</a:t>
+              <a:t>8/10/2021</a:t>
             </a:fld>
             <a:endParaRPr lang="en-US" dirty="0"/>
           </a:p>
@@ -765,7 +767,7 @@
           <a:p>
             <a:fld id="{F4367C96-DDCA-4867-8F69-39EABFA21D53}" type="slidenum">
               <a:rPr lang="en-US" smtClean="0"/>
-              <a:t>16</a:t>
+              <a:t>17</a:t>
             </a:fld>
             <a:endParaRPr lang="en-US" dirty="0"/>
           </a:p>
@@ -775,6 +777,90 @@
     <p:extLst>
       <p:ext uri="{BB962C8B-B14F-4D97-AF65-F5344CB8AC3E}">
         <p14:creationId xmlns:p14="http://schemas.microsoft.com/office/powerpoint/2010/main" val="1522652898"/>
+      </p:ext>
+    </p:extLst>
+  </p:cSld>
+  <p:clrMapOvr>
+    <a:masterClrMapping/>
+  </p:clrMapOvr>
+</p:notes>
+</file>
+
+<file path=ppt/notesSlides/notesSlide10.xml><?xml version="1.0" encoding="utf-8"?>
+<p:notes xmlns:a="http://schemas.openxmlformats.org/drawingml/2006/main" xmlns:r="http://schemas.openxmlformats.org/officeDocument/2006/relationships" xmlns:p="http://schemas.openxmlformats.org/presentationml/2006/main">
+  <p:cSld>
+    <p:spTree>
+      <p:nvGrpSpPr>
+        <p:cNvPr id="1" name=""/>
+        <p:cNvGrpSpPr/>
+        <p:nvPr/>
+      </p:nvGrpSpPr>
+      <p:grpSpPr>
+        <a:xfrm>
+          <a:off x="0" y="0"/>
+          <a:ext cx="0" cy="0"/>
+          <a:chOff x="0" y="0"/>
+          <a:chExt cx="0" cy="0"/>
+        </a:xfrm>
+      </p:grpSpPr>
+      <p:sp>
+        <p:nvSpPr>
+          <p:cNvPr id="2" name="Slide Image Placeholder 1"/>
+          <p:cNvSpPr>
+            <a:spLocks noGrp="1" noRot="1" noChangeAspect="1"/>
+          </p:cNvSpPr>
+          <p:nvPr>
+            <p:ph type="sldImg"/>
+          </p:nvPr>
+        </p:nvSpPr>
+        <p:spPr/>
+      </p:sp>
+      <p:sp>
+        <p:nvSpPr>
+          <p:cNvPr id="3" name="Notes Placeholder 2"/>
+          <p:cNvSpPr>
+            <a:spLocks noGrp="1"/>
+          </p:cNvSpPr>
+          <p:nvPr>
+            <p:ph type="body" idx="1"/>
+          </p:nvPr>
+        </p:nvSpPr>
+        <p:spPr/>
+        <p:txBody>
+          <a:bodyPr/>
+          <a:lstStyle/>
+          <a:p>
+            <a:endParaRPr lang="en-MY" dirty="0"/>
+          </a:p>
+        </p:txBody>
+      </p:sp>
+      <p:sp>
+        <p:nvSpPr>
+          <p:cNvPr id="4" name="Slide Number Placeholder 3"/>
+          <p:cNvSpPr>
+            <a:spLocks noGrp="1"/>
+          </p:cNvSpPr>
+          <p:nvPr>
+            <p:ph type="sldNum" sz="quarter" idx="5"/>
+          </p:nvPr>
+        </p:nvSpPr>
+        <p:spPr/>
+        <p:txBody>
+          <a:bodyPr/>
+          <a:lstStyle/>
+          <a:p>
+            <a:fld id="{F4367C96-DDCA-4867-8F69-39EABFA21D53}" type="slidenum">
+              <a:rPr lang="en-US" smtClean="0"/>
+              <a:t>26</a:t>
+            </a:fld>
+            <a:endParaRPr lang="en-US" dirty="0"/>
+          </a:p>
+        </p:txBody>
+      </p:sp>
+    </p:spTree>
+    <p:extLst>
+      <p:ext uri="{BB962C8B-B14F-4D97-AF65-F5344CB8AC3E}">
+        <p14:creationId xmlns:p14="http://schemas.microsoft.com/office/powerpoint/2010/main" val="1744955741"/>
       </p:ext>
     </p:extLst>
   </p:cSld>
@@ -849,7 +935,7 @@
           <a:p>
             <a:fld id="{F4367C96-DDCA-4867-8F69-39EABFA21D53}" type="slidenum">
               <a:rPr lang="en-US" smtClean="0"/>
-              <a:t>17</a:t>
+              <a:t>18</a:t>
             </a:fld>
             <a:endParaRPr lang="en-US" dirty="0"/>
           </a:p>
@@ -933,7 +1019,7 @@
           <a:p>
             <a:fld id="{F4367C96-DDCA-4867-8F69-39EABFA21D53}" type="slidenum">
               <a:rPr lang="en-US" smtClean="0"/>
-              <a:t>18</a:t>
+              <a:t>19</a:t>
             </a:fld>
             <a:endParaRPr lang="en-US" dirty="0"/>
           </a:p>
@@ -1017,7 +1103,7 @@
           <a:p>
             <a:fld id="{F4367C96-DDCA-4867-8F69-39EABFA21D53}" type="slidenum">
               <a:rPr lang="en-US" smtClean="0"/>
-              <a:t>19</a:t>
+              <a:t>20</a:t>
             </a:fld>
             <a:endParaRPr lang="en-US" dirty="0"/>
           </a:p>
@@ -1026,7 +1112,7 @@
     </p:spTree>
     <p:extLst>
       <p:ext uri="{BB962C8B-B14F-4D97-AF65-F5344CB8AC3E}">
-        <p14:creationId xmlns:p14="http://schemas.microsoft.com/office/powerpoint/2010/main" val="3742640483"/>
+        <p14:creationId xmlns:p14="http://schemas.microsoft.com/office/powerpoint/2010/main" val="2284461147"/>
       </p:ext>
     </p:extLst>
   </p:cSld>
@@ -1101,7 +1187,7 @@
           <a:p>
             <a:fld id="{F4367C96-DDCA-4867-8F69-39EABFA21D53}" type="slidenum">
               <a:rPr lang="en-US" smtClean="0"/>
-              <a:t>20</a:t>
+              <a:t>21</a:t>
             </a:fld>
             <a:endParaRPr lang="en-US" dirty="0"/>
           </a:p>
@@ -1110,7 +1196,7 @@
     </p:spTree>
     <p:extLst>
       <p:ext uri="{BB962C8B-B14F-4D97-AF65-F5344CB8AC3E}">
-        <p14:creationId xmlns:p14="http://schemas.microsoft.com/office/powerpoint/2010/main" val="3447023021"/>
+        <p14:creationId xmlns:p14="http://schemas.microsoft.com/office/powerpoint/2010/main" val="3742640483"/>
       </p:ext>
     </p:extLst>
   </p:cSld>
@@ -1185,7 +1271,7 @@
           <a:p>
             <a:fld id="{F4367C96-DDCA-4867-8F69-39EABFA21D53}" type="slidenum">
               <a:rPr lang="en-US" smtClean="0"/>
-              <a:t>21</a:t>
+              <a:t>22</a:t>
             </a:fld>
             <a:endParaRPr lang="en-US" dirty="0"/>
           </a:p>
@@ -1194,7 +1280,7 @@
     </p:spTree>
     <p:extLst>
       <p:ext uri="{BB962C8B-B14F-4D97-AF65-F5344CB8AC3E}">
-        <p14:creationId xmlns:p14="http://schemas.microsoft.com/office/powerpoint/2010/main" val="4274731091"/>
+        <p14:creationId xmlns:p14="http://schemas.microsoft.com/office/powerpoint/2010/main" val="3447023021"/>
       </p:ext>
     </p:extLst>
   </p:cSld>
@@ -1269,7 +1355,7 @@
           <a:p>
             <a:fld id="{F4367C96-DDCA-4867-8F69-39EABFA21D53}" type="slidenum">
               <a:rPr lang="en-US" smtClean="0"/>
-              <a:t>22</a:t>
+              <a:t>23</a:t>
             </a:fld>
             <a:endParaRPr lang="en-US" dirty="0"/>
           </a:p>
@@ -1278,7 +1364,7 @@
     </p:spTree>
     <p:extLst>
       <p:ext uri="{BB962C8B-B14F-4D97-AF65-F5344CB8AC3E}">
-        <p14:creationId xmlns:p14="http://schemas.microsoft.com/office/powerpoint/2010/main" val="1205285005"/>
+        <p14:creationId xmlns:p14="http://schemas.microsoft.com/office/powerpoint/2010/main" val="4274731091"/>
       </p:ext>
     </p:extLst>
   </p:cSld>
@@ -1353,7 +1439,7 @@
           <a:p>
             <a:fld id="{F4367C96-DDCA-4867-8F69-39EABFA21D53}" type="slidenum">
               <a:rPr lang="en-US" smtClean="0"/>
-              <a:t>23</a:t>
+              <a:t>24</a:t>
             </a:fld>
             <a:endParaRPr lang="en-US" dirty="0"/>
           </a:p>
@@ -1362,7 +1448,7 @@
     </p:spTree>
     <p:extLst>
       <p:ext uri="{BB962C8B-B14F-4D97-AF65-F5344CB8AC3E}">
-        <p14:creationId xmlns:p14="http://schemas.microsoft.com/office/powerpoint/2010/main" val="1322968903"/>
+        <p14:creationId xmlns:p14="http://schemas.microsoft.com/office/powerpoint/2010/main" val="1205285005"/>
       </p:ext>
     </p:extLst>
   </p:cSld>
@@ -1437,7 +1523,7 @@
           <a:p>
             <a:fld id="{F4367C96-DDCA-4867-8F69-39EABFA21D53}" type="slidenum">
               <a:rPr lang="en-US" smtClean="0"/>
-              <a:t>24</a:t>
+              <a:t>25</a:t>
             </a:fld>
             <a:endParaRPr lang="en-US" dirty="0"/>
           </a:p>
@@ -1446,7 +1532,7 @@
     </p:spTree>
     <p:extLst>
       <p:ext uri="{BB962C8B-B14F-4D97-AF65-F5344CB8AC3E}">
-        <p14:creationId xmlns:p14="http://schemas.microsoft.com/office/powerpoint/2010/main" val="1744955741"/>
+        <p14:creationId xmlns:p14="http://schemas.microsoft.com/office/powerpoint/2010/main" val="1322968903"/>
       </p:ext>
     </p:extLst>
   </p:cSld>
@@ -1631,7 +1717,7 @@
           <a:p>
             <a:fld id="{B99A8159-6B10-4896-B6E2-2809ECD1D84D}" type="datetimeFigureOut">
               <a:rPr lang="en-US" smtClean="0"/>
-              <a:t>8/9/2021</a:t>
+              <a:t>8/10/2021</a:t>
             </a:fld>
             <a:endParaRPr lang="en-US" dirty="0"/>
           </a:p>
@@ -2043,7 +2129,7 @@
           <a:p>
             <a:fld id="{B99A8159-6B10-4896-B6E2-2809ECD1D84D}" type="datetimeFigureOut">
               <a:rPr lang="en-US" smtClean="0"/>
-              <a:t>8/9/2021</a:t>
+              <a:t>8/10/2021</a:t>
             </a:fld>
             <a:endParaRPr lang="en-US" dirty="0"/>
           </a:p>
@@ -2184,7 +2270,7 @@
           <a:p>
             <a:fld id="{B99A8159-6B10-4896-B6E2-2809ECD1D84D}" type="datetimeFigureOut">
               <a:rPr lang="en-US" smtClean="0"/>
-              <a:t>8/9/2021</a:t>
+              <a:t>8/10/2021</a:t>
             </a:fld>
             <a:endParaRPr lang="en-US" dirty="0"/>
           </a:p>
@@ -2297,7 +2383,7 @@
           <a:p>
             <a:fld id="{B99A8159-6B10-4896-B6E2-2809ECD1D84D}" type="datetimeFigureOut">
               <a:rPr lang="en-US" smtClean="0"/>
-              <a:t>8/9/2021</a:t>
+              <a:t>8/10/2021</a:t>
             </a:fld>
             <a:endParaRPr lang="en-US" dirty="0"/>
           </a:p>
@@ -2608,7 +2694,7 @@
           <a:p>
             <a:fld id="{B99A8159-6B10-4896-B6E2-2809ECD1D84D}" type="datetimeFigureOut">
               <a:rPr lang="en-US" smtClean="0"/>
-              <a:t>8/9/2021</a:t>
+              <a:t>8/10/2021</a:t>
             </a:fld>
             <a:endParaRPr lang="en-US" dirty="0"/>
           </a:p>
@@ -2900,7 +2986,7 @@
           <a:p>
             <a:fld id="{B99A8159-6B10-4896-B6E2-2809ECD1D84D}" type="datetimeFigureOut">
               <a:rPr lang="en-US" smtClean="0"/>
-              <a:t>8/9/2021</a:t>
+              <a:t>8/10/2021</a:t>
             </a:fld>
             <a:endParaRPr lang="en-US" dirty="0"/>
           </a:p>
@@ -3188,7 +3274,7 @@
           <a:p>
             <a:fld id="{B99A8159-6B10-4896-B6E2-2809ECD1D84D}" type="datetimeFigureOut">
               <a:rPr lang="en-US" smtClean="0"/>
-              <a:t>8/9/2021</a:t>
+              <a:t>8/10/2021</a:t>
             </a:fld>
             <a:endParaRPr lang="en-US" dirty="0"/>
           </a:p>
@@ -3476,7 +3562,7 @@
           <a:p>
             <a:fld id="{B99A8159-6B10-4896-B6E2-2809ECD1D84D}" type="datetimeFigureOut">
               <a:rPr lang="en-US" smtClean="0"/>
-              <a:t>8/9/2021</a:t>
+              <a:t>8/10/2021</a:t>
             </a:fld>
             <a:endParaRPr lang="en-US" dirty="0"/>
           </a:p>
@@ -3764,7 +3850,7 @@
           <a:p>
             <a:fld id="{B99A8159-6B10-4896-B6E2-2809ECD1D84D}" type="datetimeFigureOut">
               <a:rPr lang="en-US" smtClean="0"/>
-              <a:t>8/9/2021</a:t>
+              <a:t>8/10/2021</a:t>
             </a:fld>
             <a:endParaRPr lang="en-US" dirty="0"/>
           </a:p>
@@ -4052,7 +4138,7 @@
           <a:p>
             <a:fld id="{B99A8159-6B10-4896-B6E2-2809ECD1D84D}" type="datetimeFigureOut">
               <a:rPr lang="en-US" smtClean="0"/>
-              <a:t>8/9/2021</a:t>
+              <a:t>8/10/2021</a:t>
             </a:fld>
             <a:endParaRPr lang="en-US" dirty="0"/>
           </a:p>
@@ -4340,7 +4426,7 @@
           <a:p>
             <a:fld id="{B99A8159-6B10-4896-B6E2-2809ECD1D84D}" type="datetimeFigureOut">
               <a:rPr lang="en-US" smtClean="0"/>
-              <a:t>8/9/2021</a:t>
+              <a:t>8/10/2021</a:t>
             </a:fld>
             <a:endParaRPr lang="en-US" dirty="0"/>
           </a:p>
@@ -4628,7 +4714,7 @@
           <a:p>
             <a:fld id="{B99A8159-6B10-4896-B6E2-2809ECD1D84D}" type="datetimeFigureOut">
               <a:rPr lang="en-US" smtClean="0"/>
-              <a:t>8/9/2021</a:t>
+              <a:t>8/10/2021</a:t>
             </a:fld>
             <a:endParaRPr lang="en-US" dirty="0"/>
           </a:p>
@@ -4903,7 +4989,7 @@
           <a:p>
             <a:fld id="{B99A8159-6B10-4896-B6E2-2809ECD1D84D}" type="datetimeFigureOut">
               <a:rPr lang="en-US" smtClean="0"/>
-              <a:t>8/9/2021</a:t>
+              <a:t>8/10/2021</a:t>
             </a:fld>
             <a:endParaRPr lang="en-US" dirty="0"/>
           </a:p>
@@ -5168,7 +5254,7 @@
           <a:p>
             <a:fld id="{B99A8159-6B10-4896-B6E2-2809ECD1D84D}" type="datetimeFigureOut">
               <a:rPr lang="en-US" smtClean="0"/>
-              <a:t>8/9/2021</a:t>
+              <a:t>8/10/2021</a:t>
             </a:fld>
             <a:endParaRPr lang="en-US" dirty="0"/>
           </a:p>
@@ -5409,7 +5495,7 @@
           <a:p>
             <a:fld id="{B99A8159-6B10-4896-B6E2-2809ECD1D84D}" type="datetimeFigureOut">
               <a:rPr lang="en-US" smtClean="0"/>
-              <a:t>8/9/2021</a:t>
+              <a:t>8/10/2021</a:t>
             </a:fld>
             <a:endParaRPr lang="en-US" dirty="0"/>
           </a:p>
@@ -5918,94 +6004,6 @@
           <p:cNvPr id="2" name="Title 1">
             <a:extLst>
               <a:ext uri="{FF2B5EF4-FFF2-40B4-BE49-F238E27FC236}">
-                <a16:creationId xmlns:a16="http://schemas.microsoft.com/office/drawing/2014/main" id="{6C14B5D2-8D31-4D6C-B863-E5FA61A0FA35}"/>
-              </a:ext>
-            </a:extLst>
-          </p:cNvPr>
-          <p:cNvSpPr>
-            <a:spLocks noGrp="1"/>
-          </p:cNvSpPr>
-          <p:nvPr>
-            <p:ph type="title"/>
-          </p:nvPr>
-        </p:nvSpPr>
-        <p:spPr/>
-        <p:txBody>
-          <a:bodyPr/>
-          <a:lstStyle/>
-          <a:p>
-            <a:r>
-              <a:rPr lang="en-MY" dirty="0"/>
-              <a:t>Restoring previous versions</a:t>
-            </a:r>
-          </a:p>
-        </p:txBody>
-      </p:sp>
-      <p:pic>
-        <p:nvPicPr>
-          <p:cNvPr id="7" name="Picture 6" descr="Text&#10;&#10;Description automatically generated">
-            <a:extLst>
-              <a:ext uri="{FF2B5EF4-FFF2-40B4-BE49-F238E27FC236}">
-                <a16:creationId xmlns:a16="http://schemas.microsoft.com/office/drawing/2014/main" id="{90E10B95-B806-4C6A-B93D-25DDA65FFF35}"/>
-              </a:ext>
-            </a:extLst>
-          </p:cNvPr>
-          <p:cNvPicPr>
-            <a:picLocks noChangeAspect="1"/>
-          </p:cNvPicPr>
-          <p:nvPr/>
-        </p:nvPicPr>
-        <p:blipFill>
-          <a:blip r:embed="rId2"/>
-          <a:stretch>
-            <a:fillRect/>
-          </a:stretch>
-        </p:blipFill>
-        <p:spPr>
-          <a:xfrm>
-            <a:off x="93642" y="1248621"/>
-            <a:ext cx="9383733" cy="5352203"/>
-          </a:xfrm>
-          <a:prstGeom prst="rect">
-            <a:avLst/>
-          </a:prstGeom>
-        </p:spPr>
-      </p:pic>
-    </p:spTree>
-    <p:extLst>
-      <p:ext uri="{BB962C8B-B14F-4D97-AF65-F5344CB8AC3E}">
-        <p14:creationId xmlns:p14="http://schemas.microsoft.com/office/powerpoint/2010/main" val="639973640"/>
-      </p:ext>
-    </p:extLst>
-  </p:cSld>
-  <p:clrMapOvr>
-    <a:masterClrMapping/>
-  </p:clrMapOvr>
-</p:sld>
-</file>
-
-<file path=ppt/slides/slide11.xml><?xml version="1.0" encoding="utf-8"?>
-<p:sld xmlns:a="http://schemas.openxmlformats.org/drawingml/2006/main" xmlns:r="http://schemas.openxmlformats.org/officeDocument/2006/relationships" xmlns:p="http://schemas.openxmlformats.org/presentationml/2006/main">
-  <p:cSld>
-    <p:spTree>
-      <p:nvGrpSpPr>
-        <p:cNvPr id="1" name=""/>
-        <p:cNvGrpSpPr/>
-        <p:nvPr/>
-      </p:nvGrpSpPr>
-      <p:grpSpPr>
-        <a:xfrm>
-          <a:off x="0" y="0"/>
-          <a:ext cx="0" cy="0"/>
-          <a:chOff x="0" y="0"/>
-          <a:chExt cx="0" cy="0"/>
-        </a:xfrm>
-      </p:grpSpPr>
-      <p:sp>
-        <p:nvSpPr>
-          <p:cNvPr id="2" name="Title 1">
-            <a:extLst>
-              <a:ext uri="{FF2B5EF4-FFF2-40B4-BE49-F238E27FC236}">
                 <a16:creationId xmlns:a16="http://schemas.microsoft.com/office/drawing/2014/main" id="{A8FC01A6-7657-4075-9DFD-F27EA0B9B657}"/>
               </a:ext>
             </a:extLst>
@@ -6073,7 +6071,7 @@
 </p:sld>
 </file>
 
-<file path=ppt/slides/slide12.xml><?xml version="1.0" encoding="utf-8"?>
+<file path=ppt/slides/slide11.xml><?xml version="1.0" encoding="utf-8"?>
 <p:sld xmlns:a="http://schemas.openxmlformats.org/drawingml/2006/main" xmlns:r="http://schemas.openxmlformats.org/officeDocument/2006/relationships" xmlns:p="http://schemas.openxmlformats.org/presentationml/2006/main">
   <p:cSld>
     <p:spTree>
@@ -6702,6 +6700,123 @@
 </p:sld>
 </file>
 
+<file path=ppt/slides/slide12.xml><?xml version="1.0" encoding="utf-8"?>
+<p:sld xmlns:a="http://schemas.openxmlformats.org/drawingml/2006/main" xmlns:r="http://schemas.openxmlformats.org/officeDocument/2006/relationships" xmlns:p="http://schemas.openxmlformats.org/presentationml/2006/main">
+  <p:cSld>
+    <p:spTree>
+      <p:nvGrpSpPr>
+        <p:cNvPr id="1" name=""/>
+        <p:cNvGrpSpPr/>
+        <p:nvPr/>
+      </p:nvGrpSpPr>
+      <p:grpSpPr>
+        <a:xfrm>
+          <a:off x="0" y="0"/>
+          <a:ext cx="0" cy="0"/>
+          <a:chOff x="0" y="0"/>
+          <a:chExt cx="0" cy="0"/>
+        </a:xfrm>
+      </p:grpSpPr>
+      <p:sp>
+        <p:nvSpPr>
+          <p:cNvPr id="2" name="Title 1"/>
+          <p:cNvSpPr>
+            <a:spLocks noGrp="1"/>
+          </p:cNvSpPr>
+          <p:nvPr>
+            <p:ph type="title"/>
+          </p:nvPr>
+        </p:nvSpPr>
+        <p:spPr>
+          <a:xfrm>
+            <a:off x="838200" y="110002"/>
+            <a:ext cx="8334376" cy="1325563"/>
+          </a:xfrm>
+        </p:spPr>
+        <p:txBody>
+          <a:bodyPr/>
+          <a:lstStyle/>
+          <a:p>
+            <a:r>
+              <a:rPr lang="en-US" dirty="0"/>
+              <a:t>Collaboration</a:t>
+            </a:r>
+          </a:p>
+        </p:txBody>
+      </p:sp>
+      <p:sp>
+        <p:nvSpPr>
+          <p:cNvPr id="3" name="Content Placeholder 2"/>
+          <p:cNvSpPr>
+            <a:spLocks noGrp="1"/>
+          </p:cNvSpPr>
+          <p:nvPr>
+            <p:ph idx="1"/>
+          </p:nvPr>
+        </p:nvSpPr>
+        <p:spPr>
+          <a:xfrm>
+            <a:off x="838200" y="1842403"/>
+            <a:ext cx="10515600" cy="4351338"/>
+          </a:xfrm>
+        </p:spPr>
+        <p:txBody>
+          <a:bodyPr/>
+          <a:lstStyle/>
+          <a:p>
+            <a:r>
+              <a:rPr lang="en-US" dirty="0"/>
+              <a:t>Create and share your repo</a:t>
+            </a:r>
+          </a:p>
+          <a:p>
+            <a:pPr marL="0" indent="0">
+              <a:buNone/>
+            </a:pPr>
+            <a:endParaRPr lang="en-US" dirty="0"/>
+          </a:p>
+          <a:p>
+            <a:pPr marL="0" indent="0">
+              <a:buNone/>
+            </a:pPr>
+            <a:r>
+              <a:rPr lang="en-US" u="sng" dirty="0"/>
+              <a:t>What do you wanna do?</a:t>
+            </a:r>
+          </a:p>
+          <a:p>
+            <a:r>
+              <a:rPr lang="en-US" dirty="0"/>
+              <a:t>I’m doing a group project!</a:t>
+            </a:r>
+          </a:p>
+          <a:p>
+            <a:r>
+              <a:rPr lang="en-US" dirty="0"/>
+              <a:t>Open-source project</a:t>
+            </a:r>
+          </a:p>
+          <a:p>
+            <a:pPr marL="0" indent="0">
+              <a:buNone/>
+            </a:pPr>
+            <a:endParaRPr lang="en-US" dirty="0"/>
+          </a:p>
+        </p:txBody>
+      </p:sp>
+    </p:spTree>
+    <p:extLst>
+      <p:ext uri="{BB962C8B-B14F-4D97-AF65-F5344CB8AC3E}">
+        <p14:creationId xmlns:p14="http://schemas.microsoft.com/office/powerpoint/2010/main" val="2833756237"/>
+      </p:ext>
+    </p:extLst>
+  </p:cSld>
+  <p:clrMapOvr>
+    <a:masterClrMapping/>
+  </p:clrMapOvr>
+</p:sld>
+</file>
+
 <file path=ppt/slides/slide13.xml><?xml version="1.0" encoding="utf-8"?>
 <p:sld xmlns:a="http://schemas.openxmlformats.org/drawingml/2006/main" xmlns:r="http://schemas.openxmlformats.org/officeDocument/2006/relationships" xmlns:p="http://schemas.openxmlformats.org/presentationml/2006/main">
   <p:cSld>
@@ -6724,7 +6839,7 @@
           <p:cNvPr id="2" name="Title 1">
             <a:extLst>
               <a:ext uri="{FF2B5EF4-FFF2-40B4-BE49-F238E27FC236}">
-                <a16:creationId xmlns:a16="http://schemas.microsoft.com/office/drawing/2014/main" id="{D47DE0EA-8D0E-4F71-BA30-530045163A55}"/>
+                <a16:creationId xmlns:a16="http://schemas.microsoft.com/office/drawing/2014/main" id="{8B2AD4E1-0643-4C88-9E49-C2724AEB3568}"/>
               </a:ext>
             </a:extLst>
           </p:cNvPr>
@@ -6735,27 +6850,14 @@
             <p:ph type="title"/>
           </p:nvPr>
         </p:nvSpPr>
-        <p:spPr>
-          <a:xfrm>
-            <a:off x="838200" y="142580"/>
-            <a:ext cx="8334376" cy="1325563"/>
-          </a:xfrm>
-        </p:spPr>
+        <p:spPr/>
         <p:txBody>
           <a:bodyPr/>
           <a:lstStyle/>
           <a:p>
             <a:r>
-              <a:rPr lang="en-MY" dirty="0"/>
-              <a:t>Remote repository, </a:t>
-            </a:r>
-            <a:r>
-              <a:rPr lang="en-MY" dirty="0" err="1"/>
-              <a:t>github</a:t>
-            </a:r>
-            <a:r>
-              <a:rPr lang="en-MY" dirty="0"/>
-              <a:t>!</a:t>
+              <a:rPr lang="en-US" dirty="0"/>
+              <a:t>Cloning an existing repo</a:t>
             </a:r>
           </a:p>
         </p:txBody>
@@ -6765,7 +6867,7 @@
           <p:cNvPr id="3" name="Content Placeholder 2">
             <a:extLst>
               <a:ext uri="{FF2B5EF4-FFF2-40B4-BE49-F238E27FC236}">
-                <a16:creationId xmlns:a16="http://schemas.microsoft.com/office/drawing/2014/main" id="{4A1CEAAC-31C8-41BE-BB8B-21876DCAE696}"/>
+                <a16:creationId xmlns:a16="http://schemas.microsoft.com/office/drawing/2014/main" id="{F8D322E9-A7EC-465F-93FE-BAA394728626}"/>
               </a:ext>
             </a:extLst>
           </p:cNvPr>
@@ -6782,44 +6884,24 @@
           <a:lstStyle/>
           <a:p>
             <a:r>
-              <a:rPr lang="en-MY" dirty="0"/>
-              <a:t>Register an account on </a:t>
-            </a:r>
-            <a:r>
-              <a:rPr lang="en-MY" dirty="0" err="1"/>
-              <a:t>Github</a:t>
-            </a:r>
-            <a:r>
-              <a:rPr lang="en-MY" dirty="0"/>
-              <a:t>!</a:t>
-            </a:r>
-          </a:p>
-          <a:p>
-            <a:r>
-              <a:rPr lang="en-MY" dirty="0"/>
-              <a:t>Origin refers to the remote repository’s name by convention.</a:t>
-            </a:r>
-          </a:p>
-          <a:p>
-            <a:endParaRPr lang="en-MY" dirty="0"/>
-          </a:p>
-          <a:p>
-            <a:endParaRPr lang="en-MY" dirty="0"/>
-          </a:p>
-          <a:p>
-            <a:endParaRPr lang="en-MY" dirty="0"/>
-          </a:p>
-          <a:p>
-            <a:endParaRPr lang="en-MY" dirty="0"/>
+              <a:rPr lang="en-US" dirty="0"/>
+              <a:t>A full copy of nearly all data is retrieved </a:t>
+            </a:r>
+          </a:p>
+          <a:p>
+            <a:r>
+              <a:rPr lang="en-US" dirty="0"/>
+              <a:t>Includes all versions of the project</a:t>
+            </a:r>
           </a:p>
         </p:txBody>
       </p:sp>
       <p:pic>
         <p:nvPicPr>
-          <p:cNvPr id="7" name="Picture 6" descr="Text&#10;&#10;Description automatically generated">
-            <a:extLst>
-              <a:ext uri="{FF2B5EF4-FFF2-40B4-BE49-F238E27FC236}">
-                <a16:creationId xmlns:a16="http://schemas.microsoft.com/office/drawing/2014/main" id="{F8DF03C7-64E0-4AA6-9279-D096C702822D}"/>
+          <p:cNvPr id="15" name="Picture 14" descr="Text&#10;&#10;Description automatically generated">
+            <a:extLst>
+              <a:ext uri="{FF2B5EF4-FFF2-40B4-BE49-F238E27FC236}">
+                <a16:creationId xmlns:a16="http://schemas.microsoft.com/office/drawing/2014/main" id="{F7C5C152-FF48-4239-8FCB-500A0A242A93}"/>
               </a:ext>
             </a:extLst>
           </p:cNvPr>
@@ -6836,8 +6918,380 @@
         </p:blipFill>
         <p:spPr>
           <a:xfrm>
-            <a:off x="0" y="2297209"/>
-            <a:ext cx="8478175" cy="3408170"/>
+            <a:off x="-176478" y="2371382"/>
+            <a:ext cx="8574754" cy="4326282"/>
+          </a:xfrm>
+          <a:prstGeom prst="rect">
+            <a:avLst/>
+          </a:prstGeom>
+        </p:spPr>
+      </p:pic>
+      <p:sp>
+        <p:nvSpPr>
+          <p:cNvPr id="16" name="Content Placeholder 2">
+            <a:extLst>
+              <a:ext uri="{FF2B5EF4-FFF2-40B4-BE49-F238E27FC236}">
+                <a16:creationId xmlns:a16="http://schemas.microsoft.com/office/drawing/2014/main" id="{EF31A08F-C129-44EC-8C6C-C30E36BA76F1}"/>
+              </a:ext>
+            </a:extLst>
+          </p:cNvPr>
+          <p:cNvSpPr txBox="1">
+            <a:spLocks/>
+          </p:cNvSpPr>
+          <p:nvPr/>
+        </p:nvSpPr>
+        <p:spPr>
+          <a:xfrm>
+            <a:off x="8706853" y="3577388"/>
+            <a:ext cx="2646947" cy="1548149"/>
+          </a:xfrm>
+          <a:prstGeom prst="rect">
+            <a:avLst/>
+          </a:prstGeom>
+        </p:spPr>
+        <p:txBody>
+          <a:bodyPr vert="horz" lIns="91440" tIns="45720" rIns="91440" bIns="45720" rtlCol="0">
+            <a:normAutofit/>
+          </a:bodyPr>
+          <a:lstStyle>
+            <a:lvl1pPr marL="228600" indent="-228600" algn="l" defTabSz="914400" rtl="0" eaLnBrk="1" latinLnBrk="0" hangingPunct="1">
+              <a:lnSpc>
+                <a:spcPct val="90000"/>
+              </a:lnSpc>
+              <a:spcBef>
+                <a:spcPts val="1000"/>
+              </a:spcBef>
+              <a:buClr>
+                <a:schemeClr val="accent5"/>
+              </a:buClr>
+              <a:buFont typeface="Wingdings" panose="05000000000000000000" pitchFamily="2" charset="2"/>
+              <a:buChar char="§"/>
+              <a:defRPr sz="2800" kern="1200">
+                <a:solidFill>
+                  <a:schemeClr val="bg1"/>
+                </a:solidFill>
+                <a:latin typeface="+mn-lt"/>
+                <a:ea typeface="+mn-ea"/>
+                <a:cs typeface="+mn-cs"/>
+              </a:defRPr>
+            </a:lvl1pPr>
+            <a:lvl2pPr marL="685800" indent="-228600" algn="l" defTabSz="914400" rtl="0" eaLnBrk="1" latinLnBrk="0" hangingPunct="1">
+              <a:lnSpc>
+                <a:spcPct val="90000"/>
+              </a:lnSpc>
+              <a:spcBef>
+                <a:spcPts val="500"/>
+              </a:spcBef>
+              <a:buClr>
+                <a:schemeClr val="accent5"/>
+              </a:buClr>
+              <a:buFont typeface="Wingdings" panose="05000000000000000000" pitchFamily="2" charset="2"/>
+              <a:buChar char="§"/>
+              <a:defRPr sz="2400" kern="1200">
+                <a:solidFill>
+                  <a:schemeClr val="bg1"/>
+                </a:solidFill>
+                <a:latin typeface="+mn-lt"/>
+                <a:ea typeface="+mn-ea"/>
+                <a:cs typeface="+mn-cs"/>
+              </a:defRPr>
+            </a:lvl2pPr>
+            <a:lvl3pPr marL="1143000" indent="-228600" algn="l" defTabSz="914400" rtl="0" eaLnBrk="1" latinLnBrk="0" hangingPunct="1">
+              <a:lnSpc>
+                <a:spcPct val="90000"/>
+              </a:lnSpc>
+              <a:spcBef>
+                <a:spcPts val="500"/>
+              </a:spcBef>
+              <a:buClr>
+                <a:schemeClr val="accent5"/>
+              </a:buClr>
+              <a:buFont typeface="Wingdings" panose="05000000000000000000" pitchFamily="2" charset="2"/>
+              <a:buChar char="§"/>
+              <a:defRPr sz="2000" kern="1200">
+                <a:solidFill>
+                  <a:schemeClr val="bg1"/>
+                </a:solidFill>
+                <a:latin typeface="+mn-lt"/>
+                <a:ea typeface="+mn-ea"/>
+                <a:cs typeface="+mn-cs"/>
+              </a:defRPr>
+            </a:lvl3pPr>
+            <a:lvl4pPr marL="1600200" indent="-228600" algn="l" defTabSz="914400" rtl="0" eaLnBrk="1" latinLnBrk="0" hangingPunct="1">
+              <a:lnSpc>
+                <a:spcPct val="90000"/>
+              </a:lnSpc>
+              <a:spcBef>
+                <a:spcPts val="500"/>
+              </a:spcBef>
+              <a:buClr>
+                <a:schemeClr val="accent5"/>
+              </a:buClr>
+              <a:buFont typeface="Wingdings" panose="05000000000000000000" pitchFamily="2" charset="2"/>
+              <a:buChar char="§"/>
+              <a:defRPr sz="1800" kern="1200">
+                <a:solidFill>
+                  <a:schemeClr val="bg1"/>
+                </a:solidFill>
+                <a:latin typeface="+mn-lt"/>
+                <a:ea typeface="+mn-ea"/>
+                <a:cs typeface="+mn-cs"/>
+              </a:defRPr>
+            </a:lvl4pPr>
+            <a:lvl5pPr marL="2057400" indent="-228600" algn="l" defTabSz="914400" rtl="0" eaLnBrk="1" latinLnBrk="0" hangingPunct="1">
+              <a:lnSpc>
+                <a:spcPct val="90000"/>
+              </a:lnSpc>
+              <a:spcBef>
+                <a:spcPts val="500"/>
+              </a:spcBef>
+              <a:buClr>
+                <a:schemeClr val="accent5"/>
+              </a:buClr>
+              <a:buFont typeface="Wingdings" panose="05000000000000000000" pitchFamily="2" charset="2"/>
+              <a:buChar char="§"/>
+              <a:defRPr sz="1800" kern="1200">
+                <a:solidFill>
+                  <a:schemeClr val="bg1"/>
+                </a:solidFill>
+                <a:latin typeface="+mn-lt"/>
+                <a:ea typeface="+mn-ea"/>
+                <a:cs typeface="+mn-cs"/>
+              </a:defRPr>
+            </a:lvl5pPr>
+            <a:lvl6pPr marL="2514600" indent="-228600" algn="l" defTabSz="914400" rtl="0" eaLnBrk="1" latinLnBrk="0" hangingPunct="1">
+              <a:lnSpc>
+                <a:spcPct val="90000"/>
+              </a:lnSpc>
+              <a:spcBef>
+                <a:spcPts val="500"/>
+              </a:spcBef>
+              <a:buFont typeface="Arial" panose="020B0604020202020204" pitchFamily="34" charset="0"/>
+              <a:buChar char="•"/>
+              <a:defRPr sz="1800" kern="1200">
+                <a:solidFill>
+                  <a:schemeClr val="tx1"/>
+                </a:solidFill>
+                <a:latin typeface="+mn-lt"/>
+                <a:ea typeface="+mn-ea"/>
+                <a:cs typeface="+mn-cs"/>
+              </a:defRPr>
+            </a:lvl6pPr>
+            <a:lvl7pPr marL="2971800" indent="-228600" algn="l" defTabSz="914400" rtl="0" eaLnBrk="1" latinLnBrk="0" hangingPunct="1">
+              <a:lnSpc>
+                <a:spcPct val="90000"/>
+              </a:lnSpc>
+              <a:spcBef>
+                <a:spcPts val="500"/>
+              </a:spcBef>
+              <a:buFont typeface="Arial" panose="020B0604020202020204" pitchFamily="34" charset="0"/>
+              <a:buChar char="•"/>
+              <a:defRPr sz="1800" kern="1200">
+                <a:solidFill>
+                  <a:schemeClr val="tx1"/>
+                </a:solidFill>
+                <a:latin typeface="+mn-lt"/>
+                <a:ea typeface="+mn-ea"/>
+                <a:cs typeface="+mn-cs"/>
+              </a:defRPr>
+            </a:lvl7pPr>
+            <a:lvl8pPr marL="3429000" indent="-228600" algn="l" defTabSz="914400" rtl="0" eaLnBrk="1" latinLnBrk="0" hangingPunct="1">
+              <a:lnSpc>
+                <a:spcPct val="90000"/>
+              </a:lnSpc>
+              <a:spcBef>
+                <a:spcPts val="500"/>
+              </a:spcBef>
+              <a:buFont typeface="Arial" panose="020B0604020202020204" pitchFamily="34" charset="0"/>
+              <a:buChar char="•"/>
+              <a:defRPr sz="1800" kern="1200">
+                <a:solidFill>
+                  <a:schemeClr val="tx1"/>
+                </a:solidFill>
+                <a:latin typeface="+mn-lt"/>
+                <a:ea typeface="+mn-ea"/>
+                <a:cs typeface="+mn-cs"/>
+              </a:defRPr>
+            </a:lvl8pPr>
+            <a:lvl9pPr marL="3886200" indent="-228600" algn="l" defTabSz="914400" rtl="0" eaLnBrk="1" latinLnBrk="0" hangingPunct="1">
+              <a:lnSpc>
+                <a:spcPct val="90000"/>
+              </a:lnSpc>
+              <a:spcBef>
+                <a:spcPts val="500"/>
+              </a:spcBef>
+              <a:buFont typeface="Arial" panose="020B0604020202020204" pitchFamily="34" charset="0"/>
+              <a:buChar char="•"/>
+              <a:defRPr sz="1800" kern="1200">
+                <a:solidFill>
+                  <a:schemeClr val="tx1"/>
+                </a:solidFill>
+                <a:latin typeface="+mn-lt"/>
+                <a:ea typeface="+mn-ea"/>
+                <a:cs typeface="+mn-cs"/>
+              </a:defRPr>
+            </a:lvl9pPr>
+          </a:lstStyle>
+          <a:p>
+            <a:pPr marL="0" indent="0">
+              <a:buNone/>
+            </a:pPr>
+            <a:r>
+              <a:rPr lang="en-US" dirty="0"/>
+              <a:t>Why?</a:t>
+            </a:r>
+          </a:p>
+        </p:txBody>
+      </p:sp>
+    </p:spTree>
+    <p:extLst>
+      <p:ext uri="{BB962C8B-B14F-4D97-AF65-F5344CB8AC3E}">
+        <p14:creationId xmlns:p14="http://schemas.microsoft.com/office/powerpoint/2010/main" val="2576156856"/>
+      </p:ext>
+    </p:extLst>
+  </p:cSld>
+  <p:clrMapOvr>
+    <a:masterClrMapping/>
+  </p:clrMapOvr>
+</p:sld>
+</file>
+
+<file path=ppt/slides/slide14.xml><?xml version="1.0" encoding="utf-8"?>
+<p:sld xmlns:a="http://schemas.openxmlformats.org/drawingml/2006/main" xmlns:r="http://schemas.openxmlformats.org/officeDocument/2006/relationships" xmlns:p="http://schemas.openxmlformats.org/presentationml/2006/main">
+  <p:cSld>
+    <p:spTree>
+      <p:nvGrpSpPr>
+        <p:cNvPr id="1" name=""/>
+        <p:cNvGrpSpPr/>
+        <p:nvPr/>
+      </p:nvGrpSpPr>
+      <p:grpSpPr>
+        <a:xfrm>
+          <a:off x="0" y="0"/>
+          <a:ext cx="0" cy="0"/>
+          <a:chOff x="0" y="0"/>
+          <a:chExt cx="0" cy="0"/>
+        </a:xfrm>
+      </p:grpSpPr>
+      <p:sp>
+        <p:nvSpPr>
+          <p:cNvPr id="2" name="Title 1">
+            <a:extLst>
+              <a:ext uri="{FF2B5EF4-FFF2-40B4-BE49-F238E27FC236}">
+                <a16:creationId xmlns:a16="http://schemas.microsoft.com/office/drawing/2014/main" id="{D47DE0EA-8D0E-4F71-BA30-530045163A55}"/>
+              </a:ext>
+            </a:extLst>
+          </p:cNvPr>
+          <p:cNvSpPr>
+            <a:spLocks noGrp="1"/>
+          </p:cNvSpPr>
+          <p:nvPr>
+            <p:ph type="title"/>
+          </p:nvPr>
+        </p:nvSpPr>
+        <p:spPr>
+          <a:xfrm>
+            <a:off x="838200" y="142580"/>
+            <a:ext cx="8334376" cy="1325563"/>
+          </a:xfrm>
+        </p:spPr>
+        <p:txBody>
+          <a:bodyPr/>
+          <a:lstStyle/>
+          <a:p>
+            <a:r>
+              <a:rPr lang="en-MY" dirty="0"/>
+              <a:t>Remote repository, </a:t>
+            </a:r>
+            <a:r>
+              <a:rPr lang="en-MY" dirty="0" err="1"/>
+              <a:t>github</a:t>
+            </a:r>
+            <a:r>
+              <a:rPr lang="en-MY" dirty="0"/>
+              <a:t>!</a:t>
+            </a:r>
+          </a:p>
+        </p:txBody>
+      </p:sp>
+      <p:sp>
+        <p:nvSpPr>
+          <p:cNvPr id="3" name="Content Placeholder 2">
+            <a:extLst>
+              <a:ext uri="{FF2B5EF4-FFF2-40B4-BE49-F238E27FC236}">
+                <a16:creationId xmlns:a16="http://schemas.microsoft.com/office/drawing/2014/main" id="{4A1CEAAC-31C8-41BE-BB8B-21876DCAE696}"/>
+              </a:ext>
+            </a:extLst>
+          </p:cNvPr>
+          <p:cNvSpPr>
+            <a:spLocks noGrp="1"/>
+          </p:cNvSpPr>
+          <p:nvPr>
+            <p:ph idx="1"/>
+          </p:nvPr>
+        </p:nvSpPr>
+        <p:spPr/>
+        <p:txBody>
+          <a:bodyPr/>
+          <a:lstStyle/>
+          <a:p>
+            <a:r>
+              <a:rPr lang="en-MY" dirty="0"/>
+              <a:t>Register an account on </a:t>
+            </a:r>
+            <a:r>
+              <a:rPr lang="en-MY" dirty="0" err="1"/>
+              <a:t>Github</a:t>
+            </a:r>
+            <a:r>
+              <a:rPr lang="en-MY" dirty="0"/>
+              <a:t>!</a:t>
+            </a:r>
+          </a:p>
+          <a:p>
+            <a:r>
+              <a:rPr lang="en-MY" dirty="0"/>
+              <a:t>Origin refers to the remote repository’s name by convention.</a:t>
+            </a:r>
+          </a:p>
+          <a:p>
+            <a:endParaRPr lang="en-MY" dirty="0"/>
+          </a:p>
+          <a:p>
+            <a:endParaRPr lang="en-MY" dirty="0"/>
+          </a:p>
+          <a:p>
+            <a:endParaRPr lang="en-MY" dirty="0"/>
+          </a:p>
+          <a:p>
+            <a:endParaRPr lang="en-MY" dirty="0"/>
+          </a:p>
+        </p:txBody>
+      </p:sp>
+      <p:pic>
+        <p:nvPicPr>
+          <p:cNvPr id="6" name="Picture 5" descr="Text&#10;&#10;Description automatically generated">
+            <a:extLst>
+              <a:ext uri="{FF2B5EF4-FFF2-40B4-BE49-F238E27FC236}">
+                <a16:creationId xmlns:a16="http://schemas.microsoft.com/office/drawing/2014/main" id="{DF05D3C2-2C51-4B63-BB54-8459435A7C9C}"/>
+              </a:ext>
+            </a:extLst>
+          </p:cNvPr>
+          <p:cNvPicPr>
+            <a:picLocks noChangeAspect="1"/>
+          </p:cNvPicPr>
+          <p:nvPr/>
+        </p:nvPicPr>
+        <p:blipFill>
+          <a:blip r:embed="rId2"/>
+          <a:stretch>
+            <a:fillRect/>
+          </a:stretch>
+        </p:blipFill>
+        <p:spPr>
+          <a:xfrm>
+            <a:off x="283808" y="2563509"/>
+            <a:ext cx="7153275" cy="2875569"/>
           </a:xfrm>
           <a:prstGeom prst="rect">
             <a:avLst/>
@@ -6857,7 +7311,7 @@
 </p:sld>
 </file>
 
-<file path=ppt/slides/slide14.xml><?xml version="1.0" encoding="utf-8"?>
+<file path=ppt/slides/slide15.xml><?xml version="1.0" encoding="utf-8"?>
 <p:sld xmlns:a="http://schemas.openxmlformats.org/drawingml/2006/main" xmlns:r="http://schemas.openxmlformats.org/officeDocument/2006/relationships" xmlns:p="http://schemas.openxmlformats.org/presentationml/2006/main">
   <p:cSld>
     <p:spTree>
@@ -7000,7 +7454,7 @@
 </p:sld>
 </file>
 
-<file path=ppt/slides/slide15.xml><?xml version="1.0" encoding="utf-8"?>
+<file path=ppt/slides/slide16.xml><?xml version="1.0" encoding="utf-8"?>
 <p:sld xmlns:a="http://schemas.openxmlformats.org/drawingml/2006/main" xmlns:r="http://schemas.openxmlformats.org/officeDocument/2006/relationships" xmlns:p="http://schemas.openxmlformats.org/presentationml/2006/main">
   <p:cSld>
     <p:spTree>
@@ -7144,7 +7598,7 @@
 </p:sld>
 </file>
 
-<file path=ppt/slides/slide16.xml><?xml version="1.0" encoding="utf-8"?>
+<file path=ppt/slides/slide17.xml><?xml version="1.0" encoding="utf-8"?>
 <p:sld xmlns:a="http://schemas.openxmlformats.org/drawingml/2006/main" xmlns:r="http://schemas.openxmlformats.org/officeDocument/2006/relationships" xmlns:p="http://schemas.openxmlformats.org/presentationml/2006/main">
   <p:cSld>
     <p:spTree>
@@ -7283,7 +7737,7 @@
 </p:sld>
 </file>
 
-<file path=ppt/slides/slide17.xml><?xml version="1.0" encoding="utf-8"?>
+<file path=ppt/slides/slide18.xml><?xml version="1.0" encoding="utf-8"?>
 <p:sld xmlns:a="http://schemas.openxmlformats.org/drawingml/2006/main" xmlns:r="http://schemas.openxmlformats.org/officeDocument/2006/relationships" xmlns:p="http://schemas.openxmlformats.org/presentationml/2006/main">
   <p:cSld>
     <p:spTree>
@@ -7430,7 +7884,7 @@
 </p:sld>
 </file>
 
-<file path=ppt/slides/slide18.xml><?xml version="1.0" encoding="utf-8"?>
+<file path=ppt/slides/slide19.xml><?xml version="1.0" encoding="utf-8"?>
 <p:sld xmlns:a="http://schemas.openxmlformats.org/drawingml/2006/main" xmlns:r="http://schemas.openxmlformats.org/officeDocument/2006/relationships" xmlns:p="http://schemas.openxmlformats.org/presentationml/2006/main">
   <p:cSld>
     <p:spTree>
@@ -7557,153 +8011,6 @@
     <p:extLst>
       <p:ext uri="{BB962C8B-B14F-4D97-AF65-F5344CB8AC3E}">
         <p14:creationId xmlns:p14="http://schemas.microsoft.com/office/powerpoint/2010/main" val="1261939104"/>
-      </p:ext>
-    </p:extLst>
-  </p:cSld>
-  <p:clrMapOvr>
-    <a:masterClrMapping/>
-  </p:clrMapOvr>
-</p:sld>
-</file>
-
-<file path=ppt/slides/slide19.xml><?xml version="1.0" encoding="utf-8"?>
-<p:sld xmlns:a="http://schemas.openxmlformats.org/drawingml/2006/main" xmlns:r="http://schemas.openxmlformats.org/officeDocument/2006/relationships" xmlns:p="http://schemas.openxmlformats.org/presentationml/2006/main">
-  <p:cSld>
-    <p:spTree>
-      <p:nvGrpSpPr>
-        <p:cNvPr id="1" name=""/>
-        <p:cNvGrpSpPr/>
-        <p:nvPr/>
-      </p:nvGrpSpPr>
-      <p:grpSpPr>
-        <a:xfrm>
-          <a:off x="0" y="0"/>
-          <a:ext cx="0" cy="0"/>
-          <a:chOff x="0" y="0"/>
-          <a:chExt cx="0" cy="0"/>
-        </a:xfrm>
-      </p:grpSpPr>
-      <p:sp>
-        <p:nvSpPr>
-          <p:cNvPr id="2" name="Title 1">
-            <a:extLst>
-              <a:ext uri="{FF2B5EF4-FFF2-40B4-BE49-F238E27FC236}">
-                <a16:creationId xmlns:a16="http://schemas.microsoft.com/office/drawing/2014/main" id="{D47DE0EA-8D0E-4F71-BA30-530045163A55}"/>
-              </a:ext>
-            </a:extLst>
-          </p:cNvPr>
-          <p:cNvSpPr>
-            <a:spLocks noGrp="1"/>
-          </p:cNvSpPr>
-          <p:nvPr>
-            <p:ph type="title"/>
-          </p:nvPr>
-        </p:nvSpPr>
-        <p:spPr>
-          <a:xfrm>
-            <a:off x="838200" y="181339"/>
-            <a:ext cx="8334376" cy="1325563"/>
-          </a:xfrm>
-        </p:spPr>
-        <p:txBody>
-          <a:bodyPr/>
-          <a:lstStyle/>
-          <a:p>
-            <a:r>
-              <a:rPr lang="en-MY" dirty="0"/>
-              <a:t>Branching</a:t>
-            </a:r>
-          </a:p>
-        </p:txBody>
-      </p:sp>
-      <p:sp>
-        <p:nvSpPr>
-          <p:cNvPr id="3" name="Content Placeholder 2">
-            <a:extLst>
-              <a:ext uri="{FF2B5EF4-FFF2-40B4-BE49-F238E27FC236}">
-                <a16:creationId xmlns:a16="http://schemas.microsoft.com/office/drawing/2014/main" id="{4A1CEAAC-31C8-41BE-BB8B-21876DCAE696}"/>
-              </a:ext>
-            </a:extLst>
-          </p:cNvPr>
-          <p:cNvSpPr>
-            <a:spLocks noGrp="1"/>
-          </p:cNvSpPr>
-          <p:nvPr>
-            <p:ph idx="1"/>
-          </p:nvPr>
-        </p:nvSpPr>
-        <p:spPr/>
-        <p:txBody>
-          <a:bodyPr/>
-          <a:lstStyle/>
-          <a:p>
-            <a:r>
-              <a:rPr lang="en-MY" dirty="0"/>
-              <a:t>Diverge from the main development line and do your own stuff without messing the main line</a:t>
-            </a:r>
-          </a:p>
-          <a:p>
-            <a:r>
-              <a:rPr lang="en-MY" dirty="0"/>
-              <a:t>Git stores snapshots, and a pointer that points to those snapshots</a:t>
-            </a:r>
-          </a:p>
-          <a:p>
-            <a:endParaRPr lang="en-MY" dirty="0"/>
-          </a:p>
-        </p:txBody>
-      </p:sp>
-      <p:pic>
-        <p:nvPicPr>
-          <p:cNvPr id="2050" name="Picture 2" descr="A branch and its commit history">
-            <a:extLst>
-              <a:ext uri="{FF2B5EF4-FFF2-40B4-BE49-F238E27FC236}">
-                <a16:creationId xmlns:a16="http://schemas.microsoft.com/office/drawing/2014/main" id="{D58936C2-1750-4459-8AA2-72B9ADAE04E8}"/>
-              </a:ext>
-            </a:extLst>
-          </p:cNvPr>
-          <p:cNvPicPr>
-            <a:picLocks noChangeAspect="1" noChangeArrowheads="1"/>
-          </p:cNvPicPr>
-          <p:nvPr/>
-        </p:nvPicPr>
-        <p:blipFill>
-          <a:blip r:embed="rId3">
-            <a:extLst>
-              <a:ext uri="{28A0092B-C50C-407E-A947-70E740481C1C}">
-                <a14:useLocalDpi xmlns:a14="http://schemas.microsoft.com/office/drawing/2010/main" val="0"/>
-              </a:ext>
-            </a:extLst>
-          </a:blip>
-          <a:srcRect/>
-          <a:stretch>
-            <a:fillRect/>
-          </a:stretch>
-        </p:blipFill>
-        <p:spPr bwMode="auto">
-          <a:xfrm>
-            <a:off x="1034716" y="3267195"/>
-            <a:ext cx="5943600" cy="3194685"/>
-          </a:xfrm>
-          <a:prstGeom prst="rect">
-            <a:avLst/>
-          </a:prstGeom>
-          <a:noFill/>
-          <a:extLst>
-            <a:ext uri="{909E8E84-426E-40DD-AFC4-6F175D3DCCD1}">
-              <a14:hiddenFill xmlns:a14="http://schemas.microsoft.com/office/drawing/2010/main">
-                <a:solidFill>
-                  <a:srgbClr val="FFFFFF"/>
-                </a:solidFill>
-              </a14:hiddenFill>
-            </a:ext>
-          </a:extLst>
-        </p:spPr>
-      </p:pic>
-    </p:spTree>
-    <p:extLst>
-      <p:ext uri="{BB962C8B-B14F-4D97-AF65-F5344CB8AC3E}">
-        <p14:creationId xmlns:p14="http://schemas.microsoft.com/office/powerpoint/2010/main" val="2105753163"/>
       </p:ext>
     </p:extLst>
   </p:cSld>
@@ -8064,6 +8371,246 @@
 </file>
 
 <file path=ppt/slides/slide20.xml><?xml version="1.0" encoding="utf-8"?>
+<p:sld xmlns:a="http://schemas.openxmlformats.org/drawingml/2006/main" xmlns:r="http://schemas.openxmlformats.org/officeDocument/2006/relationships" xmlns:p="http://schemas.openxmlformats.org/presentationml/2006/main">
+  <p:cSld>
+    <p:spTree>
+      <p:nvGrpSpPr>
+        <p:cNvPr id="1" name=""/>
+        <p:cNvGrpSpPr/>
+        <p:nvPr/>
+      </p:nvGrpSpPr>
+      <p:grpSpPr>
+        <a:xfrm>
+          <a:off x="0" y="0"/>
+          <a:ext cx="0" cy="0"/>
+          <a:chOff x="0" y="0"/>
+          <a:chExt cx="0" cy="0"/>
+        </a:xfrm>
+      </p:grpSpPr>
+      <p:sp>
+        <p:nvSpPr>
+          <p:cNvPr id="2" name="Title 1">
+            <a:extLst>
+              <a:ext uri="{FF2B5EF4-FFF2-40B4-BE49-F238E27FC236}">
+                <a16:creationId xmlns:a16="http://schemas.microsoft.com/office/drawing/2014/main" id="{D47DE0EA-8D0E-4F71-BA30-530045163A55}"/>
+              </a:ext>
+            </a:extLst>
+          </p:cNvPr>
+          <p:cNvSpPr>
+            <a:spLocks noGrp="1"/>
+          </p:cNvSpPr>
+          <p:nvPr>
+            <p:ph type="title"/>
+          </p:nvPr>
+        </p:nvSpPr>
+        <p:spPr>
+          <a:xfrm>
+            <a:off x="838199" y="181339"/>
+            <a:ext cx="9095913" cy="1325563"/>
+          </a:xfrm>
+        </p:spPr>
+        <p:txBody>
+          <a:bodyPr/>
+          <a:lstStyle/>
+          <a:p>
+            <a:r>
+              <a:rPr lang="en-MY" dirty="0"/>
+              <a:t>Story so far</a:t>
+            </a:r>
+          </a:p>
+        </p:txBody>
+      </p:sp>
+      <p:pic>
+        <p:nvPicPr>
+          <p:cNvPr id="12" name="Picture 11">
+            <a:extLst>
+              <a:ext uri="{FF2B5EF4-FFF2-40B4-BE49-F238E27FC236}">
+                <a16:creationId xmlns:a16="http://schemas.microsoft.com/office/drawing/2014/main" id="{DA0CF328-123E-40C8-ACB4-BEEE2929B7F0}"/>
+              </a:ext>
+            </a:extLst>
+          </p:cNvPr>
+          <p:cNvPicPr>
+            <a:picLocks noChangeAspect="1"/>
+          </p:cNvPicPr>
+          <p:nvPr/>
+        </p:nvPicPr>
+        <p:blipFill>
+          <a:blip r:embed="rId3"/>
+          <a:stretch>
+            <a:fillRect/>
+          </a:stretch>
+        </p:blipFill>
+        <p:spPr>
+          <a:xfrm>
+            <a:off x="838199" y="1610187"/>
+            <a:ext cx="9914765" cy="4598152"/>
+          </a:xfrm>
+          <a:prstGeom prst="rect">
+            <a:avLst/>
+          </a:prstGeom>
+        </p:spPr>
+      </p:pic>
+    </p:spTree>
+    <p:extLst>
+      <p:ext uri="{BB962C8B-B14F-4D97-AF65-F5344CB8AC3E}">
+        <p14:creationId xmlns:p14="http://schemas.microsoft.com/office/powerpoint/2010/main" val="3092724317"/>
+      </p:ext>
+    </p:extLst>
+  </p:cSld>
+  <p:clrMapOvr>
+    <a:masterClrMapping/>
+  </p:clrMapOvr>
+</p:sld>
+</file>
+
+<file path=ppt/slides/slide21.xml><?xml version="1.0" encoding="utf-8"?>
+<p:sld xmlns:a="http://schemas.openxmlformats.org/drawingml/2006/main" xmlns:r="http://schemas.openxmlformats.org/officeDocument/2006/relationships" xmlns:p="http://schemas.openxmlformats.org/presentationml/2006/main">
+  <p:cSld>
+    <p:spTree>
+      <p:nvGrpSpPr>
+        <p:cNvPr id="1" name=""/>
+        <p:cNvGrpSpPr/>
+        <p:nvPr/>
+      </p:nvGrpSpPr>
+      <p:grpSpPr>
+        <a:xfrm>
+          <a:off x="0" y="0"/>
+          <a:ext cx="0" cy="0"/>
+          <a:chOff x="0" y="0"/>
+          <a:chExt cx="0" cy="0"/>
+        </a:xfrm>
+      </p:grpSpPr>
+      <p:sp>
+        <p:nvSpPr>
+          <p:cNvPr id="2" name="Title 1">
+            <a:extLst>
+              <a:ext uri="{FF2B5EF4-FFF2-40B4-BE49-F238E27FC236}">
+                <a16:creationId xmlns:a16="http://schemas.microsoft.com/office/drawing/2014/main" id="{D47DE0EA-8D0E-4F71-BA30-530045163A55}"/>
+              </a:ext>
+            </a:extLst>
+          </p:cNvPr>
+          <p:cNvSpPr>
+            <a:spLocks noGrp="1"/>
+          </p:cNvSpPr>
+          <p:nvPr>
+            <p:ph type="title"/>
+          </p:nvPr>
+        </p:nvSpPr>
+        <p:spPr>
+          <a:xfrm>
+            <a:off x="838200" y="181339"/>
+            <a:ext cx="8334376" cy="1325563"/>
+          </a:xfrm>
+        </p:spPr>
+        <p:txBody>
+          <a:bodyPr/>
+          <a:lstStyle/>
+          <a:p>
+            <a:r>
+              <a:rPr lang="en-MY" dirty="0"/>
+              <a:t>Branching</a:t>
+            </a:r>
+          </a:p>
+        </p:txBody>
+      </p:sp>
+      <p:sp>
+        <p:nvSpPr>
+          <p:cNvPr id="3" name="Content Placeholder 2">
+            <a:extLst>
+              <a:ext uri="{FF2B5EF4-FFF2-40B4-BE49-F238E27FC236}">
+                <a16:creationId xmlns:a16="http://schemas.microsoft.com/office/drawing/2014/main" id="{4A1CEAAC-31C8-41BE-BB8B-21876DCAE696}"/>
+              </a:ext>
+            </a:extLst>
+          </p:cNvPr>
+          <p:cNvSpPr>
+            <a:spLocks noGrp="1"/>
+          </p:cNvSpPr>
+          <p:nvPr>
+            <p:ph idx="1"/>
+          </p:nvPr>
+        </p:nvSpPr>
+        <p:spPr/>
+        <p:txBody>
+          <a:bodyPr/>
+          <a:lstStyle/>
+          <a:p>
+            <a:r>
+              <a:rPr lang="en-MY" dirty="0"/>
+              <a:t>Diverge from the main development line and do your own stuff without messing the main line</a:t>
+            </a:r>
+          </a:p>
+          <a:p>
+            <a:r>
+              <a:rPr lang="en-MY" dirty="0"/>
+              <a:t>Git stores snapshots, and a pointer that points to those snapshots</a:t>
+            </a:r>
+          </a:p>
+          <a:p>
+            <a:endParaRPr lang="en-MY" dirty="0"/>
+          </a:p>
+        </p:txBody>
+      </p:sp>
+      <p:pic>
+        <p:nvPicPr>
+          <p:cNvPr id="2050" name="Picture 2" descr="A branch and its commit history">
+            <a:extLst>
+              <a:ext uri="{FF2B5EF4-FFF2-40B4-BE49-F238E27FC236}">
+                <a16:creationId xmlns:a16="http://schemas.microsoft.com/office/drawing/2014/main" id="{D58936C2-1750-4459-8AA2-72B9ADAE04E8}"/>
+              </a:ext>
+            </a:extLst>
+          </p:cNvPr>
+          <p:cNvPicPr>
+            <a:picLocks noChangeAspect="1" noChangeArrowheads="1"/>
+          </p:cNvPicPr>
+          <p:nvPr/>
+        </p:nvPicPr>
+        <p:blipFill>
+          <a:blip r:embed="rId3">
+            <a:extLst>
+              <a:ext uri="{28A0092B-C50C-407E-A947-70E740481C1C}">
+                <a14:useLocalDpi xmlns:a14="http://schemas.microsoft.com/office/drawing/2010/main" val="0"/>
+              </a:ext>
+            </a:extLst>
+          </a:blip>
+          <a:srcRect/>
+          <a:stretch>
+            <a:fillRect/>
+          </a:stretch>
+        </p:blipFill>
+        <p:spPr bwMode="auto">
+          <a:xfrm>
+            <a:off x="1034716" y="3267195"/>
+            <a:ext cx="5943600" cy="3194685"/>
+          </a:xfrm>
+          <a:prstGeom prst="rect">
+            <a:avLst/>
+          </a:prstGeom>
+          <a:noFill/>
+          <a:extLst>
+            <a:ext uri="{909E8E84-426E-40DD-AFC4-6F175D3DCCD1}">
+              <a14:hiddenFill xmlns:a14="http://schemas.microsoft.com/office/drawing/2010/main">
+                <a:solidFill>
+                  <a:srgbClr val="FFFFFF"/>
+                </a:solidFill>
+              </a14:hiddenFill>
+            </a:ext>
+          </a:extLst>
+        </p:spPr>
+      </p:pic>
+    </p:spTree>
+    <p:extLst>
+      <p:ext uri="{BB962C8B-B14F-4D97-AF65-F5344CB8AC3E}">
+        <p14:creationId xmlns:p14="http://schemas.microsoft.com/office/powerpoint/2010/main" val="2105753163"/>
+      </p:ext>
+    </p:extLst>
+  </p:cSld>
+  <p:clrMapOvr>
+    <a:masterClrMapping/>
+  </p:clrMapOvr>
+</p:sld>
+</file>
+
+<file path=ppt/slides/slide22.xml><?xml version="1.0" encoding="utf-8"?>
 <p:sld xmlns:a="http://schemas.openxmlformats.org/drawingml/2006/main" xmlns:r="http://schemas.openxmlformats.org/officeDocument/2006/relationships" xmlns:p="http://schemas.openxmlformats.org/presentationml/2006/main">
   <p:cSld>
     <p:spTree>
@@ -9953,7 +10500,7 @@
 </p:sld>
 </file>
 
-<file path=ppt/slides/slide21.xml><?xml version="1.0" encoding="utf-8"?>
+<file path=ppt/slides/slide23.xml><?xml version="1.0" encoding="utf-8"?>
 <p:sld xmlns:a="http://schemas.openxmlformats.org/drawingml/2006/main" xmlns:r="http://schemas.openxmlformats.org/officeDocument/2006/relationships" xmlns:p="http://schemas.openxmlformats.org/presentationml/2006/main">
   <p:cSld>
     <p:spTree>
@@ -10081,7 +10628,7 @@
 </p:sld>
 </file>
 
-<file path=ppt/slides/slide22.xml><?xml version="1.0" encoding="utf-8"?>
+<file path=ppt/slides/slide24.xml><?xml version="1.0" encoding="utf-8"?>
 <p:sld xmlns:a="http://schemas.openxmlformats.org/drawingml/2006/main" xmlns:r="http://schemas.openxmlformats.org/officeDocument/2006/relationships" xmlns:p="http://schemas.openxmlformats.org/presentationml/2006/main">
   <p:cSld>
     <p:spTree>
@@ -10159,9 +10706,12 @@
           </a:bodyPr>
           <a:lstStyle/>
           <a:p>
+            <a:pPr marL="0" indent="0">
+              <a:buNone/>
+            </a:pPr>
             <a:r>
               <a:rPr lang="en-MY" dirty="0"/>
-              <a:t>Forking :</a:t>
+              <a:t>Contributing to open source by forking:</a:t>
             </a:r>
           </a:p>
           <a:p>
@@ -10201,7 +10751,7 @@
 </p:sld>
 </file>
 
-<file path=ppt/slides/slide23.xml><?xml version="1.0" encoding="utf-8"?>
+<file path=ppt/slides/slide25.xml><?xml version="1.0" encoding="utf-8"?>
 <p:sld xmlns:a="http://schemas.openxmlformats.org/drawingml/2006/main" xmlns:r="http://schemas.openxmlformats.org/officeDocument/2006/relationships" xmlns:p="http://schemas.openxmlformats.org/presentationml/2006/main">
   <p:cSld>
     <p:spTree>
@@ -10362,7 +10912,7 @@
 </p:sld>
 </file>
 
-<file path=ppt/slides/slide24.xml><?xml version="1.0" encoding="utf-8"?>
+<file path=ppt/slides/slide26.xml><?xml version="1.0" encoding="utf-8"?>
 <p:sld xmlns:a="http://schemas.openxmlformats.org/drawingml/2006/main" xmlns:r="http://schemas.openxmlformats.org/officeDocument/2006/relationships" xmlns:p="http://schemas.openxmlformats.org/presentationml/2006/main">
   <p:cSld>
     <p:spTree>
@@ -10496,7 +11046,7 @@
 </p:sld>
 </file>
 
-<file path=ppt/slides/slide25.xml><?xml version="1.0" encoding="utf-8"?>
+<file path=ppt/slides/slide27.xml><?xml version="1.0" encoding="utf-8"?>
 <p:sld xmlns:a="http://schemas.openxmlformats.org/drawingml/2006/main" xmlns:r="http://schemas.openxmlformats.org/officeDocument/2006/relationships" xmlns:p="http://schemas.openxmlformats.org/presentationml/2006/main">
   <p:cSld>
     <p:bg>
@@ -10589,13 +11139,19 @@
           <a:p>
             <a:r>
               <a:rPr lang="en-US" dirty="0"/>
+              <a:t>Small but frequent commits</a:t>
+            </a:r>
+          </a:p>
+          <a:p>
+            <a:r>
+              <a:rPr lang="en-US" dirty="0"/>
               <a:t>Commit related changes only (wrap related changes)</a:t>
             </a:r>
           </a:p>
           <a:p>
             <a:r>
               <a:rPr lang="en-US" dirty="0"/>
-              <a:t>Commit completed work/changes</a:t>
+              <a:t>Commit completed changes</a:t>
             </a:r>
           </a:p>
           <a:p>
@@ -10622,7 +11178,7 @@
 </p:sld>
 </file>
 
-<file path=ppt/slides/slide26.xml><?xml version="1.0" encoding="utf-8"?>
+<file path=ppt/slides/slide28.xml><?xml version="1.0" encoding="utf-8"?>
 <p:sld xmlns:a="http://schemas.openxmlformats.org/drawingml/2006/main" xmlns:r="http://schemas.openxmlformats.org/officeDocument/2006/relationships" xmlns:p="http://schemas.openxmlformats.org/presentationml/2006/main">
   <p:cSld>
     <p:spTree>
@@ -11072,7 +11628,7 @@
 </p:sld>
 </file>
 
-<file path=ppt/slides/slide27.xml><?xml version="1.0" encoding="utf-8"?>
+<file path=ppt/slides/slide29.xml><?xml version="1.0" encoding="utf-8"?>
 <p:sld xmlns:a="http://schemas.openxmlformats.org/drawingml/2006/main" xmlns:r="http://schemas.openxmlformats.org/officeDocument/2006/relationships" xmlns:p="http://schemas.openxmlformats.org/presentationml/2006/main">
   <p:cSld>
     <p:spTree>
@@ -11193,7 +11749,643 @@
 </p:sld>
 </file>
 
-<file path=ppt/slides/slide28.xml><?xml version="1.0" encoding="utf-8"?>
+<file path=ppt/slides/slide3.xml><?xml version="1.0" encoding="utf-8"?>
+<p:sld xmlns:a="http://schemas.openxmlformats.org/drawingml/2006/main" xmlns:r="http://schemas.openxmlformats.org/officeDocument/2006/relationships" xmlns:p="http://schemas.openxmlformats.org/presentationml/2006/main">
+  <p:cSld>
+    <p:spTree>
+      <p:nvGrpSpPr>
+        <p:cNvPr id="1" name=""/>
+        <p:cNvGrpSpPr/>
+        <p:nvPr/>
+      </p:nvGrpSpPr>
+      <p:grpSpPr>
+        <a:xfrm>
+          <a:off x="0" y="0"/>
+          <a:ext cx="0" cy="0"/>
+          <a:chOff x="0" y="0"/>
+          <a:chExt cx="0" cy="0"/>
+        </a:xfrm>
+      </p:grpSpPr>
+      <p:sp>
+        <p:nvSpPr>
+          <p:cNvPr id="3" name="Content Placeholder 2">
+            <a:extLst>
+              <a:ext uri="{FF2B5EF4-FFF2-40B4-BE49-F238E27FC236}">
+                <a16:creationId xmlns:a16="http://schemas.microsoft.com/office/drawing/2014/main" id="{6CD1FD88-1DF5-4CB5-97CD-1BF062D3DAAF}"/>
+              </a:ext>
+            </a:extLst>
+          </p:cNvPr>
+          <p:cNvSpPr>
+            <a:spLocks noGrp="1"/>
+          </p:cNvSpPr>
+          <p:nvPr>
+            <p:ph idx="1"/>
+          </p:nvPr>
+        </p:nvSpPr>
+        <p:spPr>
+          <a:xfrm>
+            <a:off x="754310" y="491775"/>
+            <a:ext cx="10515600" cy="4351338"/>
+          </a:xfrm>
+        </p:spPr>
+        <p:txBody>
+          <a:bodyPr/>
+          <a:lstStyle/>
+          <a:p>
+            <a:pPr marL="0" indent="0" algn="ctr">
+              <a:buNone/>
+            </a:pPr>
+            <a:r>
+              <a:rPr lang="en-US" sz="3600" dirty="0">
+                <a:latin typeface="+mj-lt"/>
+              </a:rPr>
+              <a:t>A system that:</a:t>
+            </a:r>
+          </a:p>
+          <a:p>
+            <a:pPr marL="0" indent="0">
+              <a:buNone/>
+            </a:pPr>
+            <a:endParaRPr lang="en-US" dirty="0">
+              <a:latin typeface="+mj-lt"/>
+            </a:endParaRPr>
+          </a:p>
+        </p:txBody>
+      </p:sp>
+      <p:sp>
+        <p:nvSpPr>
+          <p:cNvPr id="4" name="Rectangle: Rounded Corners 3">
+            <a:extLst>
+              <a:ext uri="{FF2B5EF4-FFF2-40B4-BE49-F238E27FC236}">
+                <a16:creationId xmlns:a16="http://schemas.microsoft.com/office/drawing/2014/main" id="{271A5690-00A1-4EBD-BA23-2FFBBEBB9A86}"/>
+              </a:ext>
+            </a:extLst>
+          </p:cNvPr>
+          <p:cNvSpPr/>
+          <p:nvPr/>
+        </p:nvSpPr>
+        <p:spPr>
+          <a:xfrm>
+            <a:off x="1165370" y="1627464"/>
+            <a:ext cx="1888261" cy="1563018"/>
+          </a:xfrm>
+          <a:prstGeom prst="roundRect">
+            <a:avLst/>
+          </a:prstGeom>
+          <a:solidFill>
+            <a:schemeClr val="bg2"/>
+          </a:solidFill>
+          <a:ln>
+            <a:noFill/>
+          </a:ln>
+        </p:spPr>
+        <p:style>
+          <a:lnRef idx="2">
+            <a:schemeClr val="accent1">
+              <a:shade val="50000"/>
+            </a:schemeClr>
+          </a:lnRef>
+          <a:fillRef idx="1">
+            <a:schemeClr val="accent1"/>
+          </a:fillRef>
+          <a:effectRef idx="0">
+            <a:schemeClr val="accent1"/>
+          </a:effectRef>
+          <a:fontRef idx="minor">
+            <a:schemeClr val="lt1"/>
+          </a:fontRef>
+        </p:style>
+        <p:txBody>
+          <a:bodyPr rtlCol="0" anchor="ctr"/>
+          <a:lstStyle/>
+          <a:p>
+            <a:pPr algn="ctr"/>
+            <a:r>
+              <a:rPr lang="en-MY" dirty="0">
+                <a:solidFill>
+                  <a:schemeClr val="tx1"/>
+                </a:solidFill>
+              </a:rPr>
+              <a:t>Records changes made</a:t>
+            </a:r>
+          </a:p>
+        </p:txBody>
+      </p:sp>
+      <p:sp>
+        <p:nvSpPr>
+          <p:cNvPr id="7" name="Rectangle: Rounded Corners 6">
+            <a:extLst>
+              <a:ext uri="{FF2B5EF4-FFF2-40B4-BE49-F238E27FC236}">
+                <a16:creationId xmlns:a16="http://schemas.microsoft.com/office/drawing/2014/main" id="{00AEEC39-7F46-4F51-B127-BBA8315603FF}"/>
+              </a:ext>
+            </a:extLst>
+          </p:cNvPr>
+          <p:cNvSpPr/>
+          <p:nvPr/>
+        </p:nvSpPr>
+        <p:spPr>
+          <a:xfrm>
+            <a:off x="3817689" y="1627464"/>
+            <a:ext cx="1888261" cy="1563018"/>
+          </a:xfrm>
+          <a:prstGeom prst="roundRect">
+            <a:avLst/>
+          </a:prstGeom>
+          <a:solidFill>
+            <a:schemeClr val="bg2"/>
+          </a:solidFill>
+          <a:ln>
+            <a:noFill/>
+          </a:ln>
+        </p:spPr>
+        <p:style>
+          <a:lnRef idx="2">
+            <a:schemeClr val="accent6">
+              <a:shade val="50000"/>
+            </a:schemeClr>
+          </a:lnRef>
+          <a:fillRef idx="1">
+            <a:schemeClr val="accent6"/>
+          </a:fillRef>
+          <a:effectRef idx="0">
+            <a:schemeClr val="accent6"/>
+          </a:effectRef>
+          <a:fontRef idx="minor">
+            <a:schemeClr val="lt1"/>
+          </a:fontRef>
+        </p:style>
+        <p:txBody>
+          <a:bodyPr rtlCol="0" anchor="ctr"/>
+          <a:lstStyle/>
+          <a:p>
+            <a:pPr algn="ctr"/>
+            <a:r>
+              <a:rPr lang="en-MY" dirty="0">
+                <a:solidFill>
+                  <a:schemeClr val="tx1"/>
+                </a:solidFill>
+              </a:rPr>
+              <a:t>Can recover previous versions</a:t>
+            </a:r>
+          </a:p>
+        </p:txBody>
+      </p:sp>
+      <p:sp>
+        <p:nvSpPr>
+          <p:cNvPr id="8" name="Rectangle: Rounded Corners 7">
+            <a:extLst>
+              <a:ext uri="{FF2B5EF4-FFF2-40B4-BE49-F238E27FC236}">
+                <a16:creationId xmlns:a16="http://schemas.microsoft.com/office/drawing/2014/main" id="{80E687EE-9A7E-4C1F-949E-E87410C1267F}"/>
+              </a:ext>
+            </a:extLst>
+          </p:cNvPr>
+          <p:cNvSpPr/>
+          <p:nvPr/>
+        </p:nvSpPr>
+        <p:spPr>
+          <a:xfrm>
+            <a:off x="6470008" y="1627464"/>
+            <a:ext cx="1888261" cy="1563018"/>
+          </a:xfrm>
+          <a:prstGeom prst="roundRect">
+            <a:avLst/>
+          </a:prstGeom>
+          <a:solidFill>
+            <a:schemeClr val="accent6"/>
+          </a:solidFill>
+          <a:ln>
+            <a:noFill/>
+          </a:ln>
+        </p:spPr>
+        <p:style>
+          <a:lnRef idx="1">
+            <a:schemeClr val="accent4"/>
+          </a:lnRef>
+          <a:fillRef idx="3">
+            <a:schemeClr val="accent4"/>
+          </a:fillRef>
+          <a:effectRef idx="2">
+            <a:schemeClr val="accent4"/>
+          </a:effectRef>
+          <a:fontRef idx="minor">
+            <a:schemeClr val="lt1"/>
+          </a:fontRef>
+        </p:style>
+        <p:txBody>
+          <a:bodyPr rtlCol="0" anchor="ctr"/>
+          <a:lstStyle/>
+          <a:p>
+            <a:pPr algn="ctr"/>
+            <a:r>
+              <a:rPr lang="en-MY" dirty="0">
+                <a:solidFill>
+                  <a:schemeClr val="bg2"/>
+                </a:solidFill>
+              </a:rPr>
+              <a:t>Allows us to work independently in a team</a:t>
+            </a:r>
+          </a:p>
+        </p:txBody>
+      </p:sp>
+      <p:sp>
+        <p:nvSpPr>
+          <p:cNvPr id="9" name="Rectangle: Rounded Corners 8">
+            <a:extLst>
+              <a:ext uri="{FF2B5EF4-FFF2-40B4-BE49-F238E27FC236}">
+                <a16:creationId xmlns:a16="http://schemas.microsoft.com/office/drawing/2014/main" id="{61A158EC-5DDB-4778-BA26-5238F108FB5C}"/>
+              </a:ext>
+            </a:extLst>
+          </p:cNvPr>
+          <p:cNvSpPr/>
+          <p:nvPr/>
+        </p:nvSpPr>
+        <p:spPr>
+          <a:xfrm>
+            <a:off x="9122327" y="1627464"/>
+            <a:ext cx="1888261" cy="1563018"/>
+          </a:xfrm>
+          <a:prstGeom prst="roundRect">
+            <a:avLst/>
+          </a:prstGeom>
+          <a:solidFill>
+            <a:schemeClr val="accent6"/>
+          </a:solidFill>
+          <a:ln>
+            <a:noFill/>
+          </a:ln>
+        </p:spPr>
+        <p:style>
+          <a:lnRef idx="1">
+            <a:schemeClr val="accent1"/>
+          </a:lnRef>
+          <a:fillRef idx="3">
+            <a:schemeClr val="accent1"/>
+          </a:fillRef>
+          <a:effectRef idx="2">
+            <a:schemeClr val="accent1"/>
+          </a:effectRef>
+          <a:fontRef idx="minor">
+            <a:schemeClr val="lt1"/>
+          </a:fontRef>
+        </p:style>
+        <p:txBody>
+          <a:bodyPr rtlCol="0" anchor="ctr"/>
+          <a:lstStyle/>
+          <a:p>
+            <a:pPr algn="ctr"/>
+            <a:r>
+              <a:rPr lang="en-MY" dirty="0">
+                <a:solidFill>
+                  <a:schemeClr val="bg2"/>
+                </a:solidFill>
+              </a:rPr>
+              <a:t>Stores files in one place</a:t>
+            </a:r>
+          </a:p>
+        </p:txBody>
+      </p:sp>
+      <p:sp>
+        <p:nvSpPr>
+          <p:cNvPr id="11" name="Title 1">
+            <a:extLst>
+              <a:ext uri="{FF2B5EF4-FFF2-40B4-BE49-F238E27FC236}">
+                <a16:creationId xmlns:a16="http://schemas.microsoft.com/office/drawing/2014/main" id="{BDDB32F0-D524-4A32-8A3E-88EC14C9D5FC}"/>
+              </a:ext>
+            </a:extLst>
+          </p:cNvPr>
+          <p:cNvSpPr txBox="1">
+            <a:spLocks/>
+          </p:cNvSpPr>
+          <p:nvPr/>
+        </p:nvSpPr>
+        <p:spPr>
+          <a:xfrm>
+            <a:off x="4455515" y="3875735"/>
+            <a:ext cx="3280969" cy="711142"/>
+          </a:xfrm>
+          <a:prstGeom prst="rect">
+            <a:avLst/>
+          </a:prstGeom>
+        </p:spPr>
+        <p:txBody>
+          <a:bodyPr vert="horz" lIns="91440" tIns="45720" rIns="91440" bIns="45720" rtlCol="0" anchor="ctr">
+            <a:noAutofit/>
+          </a:bodyPr>
+          <a:lstStyle>
+            <a:lvl1pPr algn="l" defTabSz="914400" rtl="0" eaLnBrk="1" latinLnBrk="0" hangingPunct="1">
+              <a:lnSpc>
+                <a:spcPct val="90000"/>
+              </a:lnSpc>
+              <a:spcBef>
+                <a:spcPct val="0"/>
+              </a:spcBef>
+              <a:buNone/>
+              <a:defRPr sz="4400" kern="1200">
+                <a:solidFill>
+                  <a:schemeClr val="bg1"/>
+                </a:solidFill>
+                <a:latin typeface="+mj-lt"/>
+                <a:ea typeface="+mj-ea"/>
+                <a:cs typeface="+mj-cs"/>
+              </a:defRPr>
+            </a:lvl1pPr>
+          </a:lstStyle>
+          <a:p>
+            <a:pPr algn="ctr"/>
+            <a:r>
+              <a:rPr lang="en-US" sz="3600" dirty="0"/>
+              <a:t>Introducing</a:t>
+            </a:r>
+          </a:p>
+        </p:txBody>
+      </p:sp>
+      <p:pic>
+        <p:nvPicPr>
+          <p:cNvPr id="4100" name="Picture 4" descr="Git and Github: A Beginner's Guide">
+            <a:extLst>
+              <a:ext uri="{FF2B5EF4-FFF2-40B4-BE49-F238E27FC236}">
+                <a16:creationId xmlns:a16="http://schemas.microsoft.com/office/drawing/2014/main" id="{3A337843-39E4-4121-93B3-8A13AB6A5E48}"/>
+              </a:ext>
+            </a:extLst>
+          </p:cNvPr>
+          <p:cNvPicPr>
+            <a:picLocks noChangeAspect="1" noChangeArrowheads="1"/>
+          </p:cNvPicPr>
+          <p:nvPr/>
+        </p:nvPicPr>
+        <p:blipFill rotWithShape="1">
+          <a:blip r:embed="rId2">
+            <a:extLst>
+              <a:ext uri="{28A0092B-C50C-407E-A947-70E740481C1C}">
+                <a14:useLocalDpi xmlns:a14="http://schemas.microsoft.com/office/drawing/2010/main" val="0"/>
+              </a:ext>
+            </a:extLst>
+          </a:blip>
+          <a:srcRect l="7873" t="14309" r="8197" b="21632"/>
+          <a:stretch/>
+        </p:blipFill>
+        <p:spPr bwMode="auto">
+          <a:xfrm>
+            <a:off x="477841" y="4903247"/>
+            <a:ext cx="3263317" cy="1388496"/>
+          </a:xfrm>
+          <a:prstGeom prst="rect">
+            <a:avLst/>
+          </a:prstGeom>
+          <a:noFill/>
+          <a:extLst>
+            <a:ext uri="{909E8E84-426E-40DD-AFC4-6F175D3DCCD1}">
+              <a14:hiddenFill xmlns:a14="http://schemas.microsoft.com/office/drawing/2010/main">
+                <a:solidFill>
+                  <a:srgbClr val="FFFFFF"/>
+                </a:solidFill>
+              </a14:hiddenFill>
+            </a:ext>
+          </a:extLst>
+        </p:spPr>
+      </p:pic>
+      <p:sp>
+        <p:nvSpPr>
+          <p:cNvPr id="13" name="Content Placeholder 2">
+            <a:extLst>
+              <a:ext uri="{FF2B5EF4-FFF2-40B4-BE49-F238E27FC236}">
+                <a16:creationId xmlns:a16="http://schemas.microsoft.com/office/drawing/2014/main" id="{9B0E902E-D838-4A61-A3B3-8901FC18962B}"/>
+              </a:ext>
+            </a:extLst>
+          </p:cNvPr>
+          <p:cNvSpPr txBox="1">
+            <a:spLocks/>
+          </p:cNvSpPr>
+          <p:nvPr/>
+        </p:nvSpPr>
+        <p:spPr>
+          <a:xfrm>
+            <a:off x="4035103" y="5041782"/>
+            <a:ext cx="7592037" cy="1388496"/>
+          </a:xfrm>
+          <a:prstGeom prst="rect">
+            <a:avLst/>
+          </a:prstGeom>
+        </p:spPr>
+        <p:txBody>
+          <a:bodyPr vert="horz" lIns="91440" tIns="45720" rIns="91440" bIns="45720" rtlCol="0">
+            <a:normAutofit fontScale="92500"/>
+          </a:bodyPr>
+          <a:lstStyle>
+            <a:lvl1pPr marL="228600" indent="-228600" algn="l" defTabSz="914400" rtl="0" eaLnBrk="1" latinLnBrk="0" hangingPunct="1">
+              <a:lnSpc>
+                <a:spcPct val="90000"/>
+              </a:lnSpc>
+              <a:spcBef>
+                <a:spcPts val="1000"/>
+              </a:spcBef>
+              <a:buClr>
+                <a:schemeClr val="accent4"/>
+              </a:buClr>
+              <a:buFont typeface="Wingdings" panose="05000000000000000000" pitchFamily="2" charset="2"/>
+              <a:buChar char="§"/>
+              <a:defRPr sz="2800" kern="1200">
+                <a:solidFill>
+                  <a:schemeClr val="bg1"/>
+                </a:solidFill>
+                <a:latin typeface="+mn-lt"/>
+                <a:ea typeface="+mn-ea"/>
+                <a:cs typeface="+mn-cs"/>
+              </a:defRPr>
+            </a:lvl1pPr>
+            <a:lvl2pPr marL="685800" indent="-228600" algn="l" defTabSz="914400" rtl="0" eaLnBrk="1" latinLnBrk="0" hangingPunct="1">
+              <a:lnSpc>
+                <a:spcPct val="90000"/>
+              </a:lnSpc>
+              <a:spcBef>
+                <a:spcPts val="500"/>
+              </a:spcBef>
+              <a:buClr>
+                <a:schemeClr val="accent4"/>
+              </a:buClr>
+              <a:buFont typeface="Wingdings" panose="05000000000000000000" pitchFamily="2" charset="2"/>
+              <a:buChar char="§"/>
+              <a:defRPr sz="2400" kern="1200">
+                <a:solidFill>
+                  <a:schemeClr val="bg1"/>
+                </a:solidFill>
+                <a:latin typeface="+mn-lt"/>
+                <a:ea typeface="+mn-ea"/>
+                <a:cs typeface="+mn-cs"/>
+              </a:defRPr>
+            </a:lvl2pPr>
+            <a:lvl3pPr marL="1143000" indent="-228600" algn="l" defTabSz="914400" rtl="0" eaLnBrk="1" latinLnBrk="0" hangingPunct="1">
+              <a:lnSpc>
+                <a:spcPct val="90000"/>
+              </a:lnSpc>
+              <a:spcBef>
+                <a:spcPts val="500"/>
+              </a:spcBef>
+              <a:buClr>
+                <a:schemeClr val="accent4"/>
+              </a:buClr>
+              <a:buFont typeface="Wingdings" panose="05000000000000000000" pitchFamily="2" charset="2"/>
+              <a:buChar char="§"/>
+              <a:defRPr sz="2000" kern="1200">
+                <a:solidFill>
+                  <a:schemeClr val="bg1"/>
+                </a:solidFill>
+                <a:latin typeface="+mn-lt"/>
+                <a:ea typeface="+mn-ea"/>
+                <a:cs typeface="+mn-cs"/>
+              </a:defRPr>
+            </a:lvl3pPr>
+            <a:lvl4pPr marL="1600200" indent="-228600" algn="l" defTabSz="914400" rtl="0" eaLnBrk="1" latinLnBrk="0" hangingPunct="1">
+              <a:lnSpc>
+                <a:spcPct val="90000"/>
+              </a:lnSpc>
+              <a:spcBef>
+                <a:spcPts val="500"/>
+              </a:spcBef>
+              <a:buClr>
+                <a:schemeClr val="accent4"/>
+              </a:buClr>
+              <a:buFont typeface="Wingdings" panose="05000000000000000000" pitchFamily="2" charset="2"/>
+              <a:buChar char="§"/>
+              <a:defRPr sz="1800" kern="1200">
+                <a:solidFill>
+                  <a:schemeClr val="bg1"/>
+                </a:solidFill>
+                <a:latin typeface="+mn-lt"/>
+                <a:ea typeface="+mn-ea"/>
+                <a:cs typeface="+mn-cs"/>
+              </a:defRPr>
+            </a:lvl4pPr>
+            <a:lvl5pPr marL="2057400" indent="-228600" algn="l" defTabSz="914400" rtl="0" eaLnBrk="1" latinLnBrk="0" hangingPunct="1">
+              <a:lnSpc>
+                <a:spcPct val="90000"/>
+              </a:lnSpc>
+              <a:spcBef>
+                <a:spcPts val="500"/>
+              </a:spcBef>
+              <a:buClr>
+                <a:schemeClr val="accent4"/>
+              </a:buClr>
+              <a:buFont typeface="Wingdings" panose="05000000000000000000" pitchFamily="2" charset="2"/>
+              <a:buChar char="§"/>
+              <a:defRPr sz="1800" kern="1200">
+                <a:solidFill>
+                  <a:schemeClr val="bg1"/>
+                </a:solidFill>
+                <a:latin typeface="+mn-lt"/>
+                <a:ea typeface="+mn-ea"/>
+                <a:cs typeface="+mn-cs"/>
+              </a:defRPr>
+            </a:lvl5pPr>
+            <a:lvl6pPr marL="2514600" indent="-228600" algn="l" defTabSz="914400" rtl="0" eaLnBrk="1" latinLnBrk="0" hangingPunct="1">
+              <a:lnSpc>
+                <a:spcPct val="90000"/>
+              </a:lnSpc>
+              <a:spcBef>
+                <a:spcPts val="500"/>
+              </a:spcBef>
+              <a:buFont typeface="Arial" panose="020B0604020202020204" pitchFamily="34" charset="0"/>
+              <a:buChar char="•"/>
+              <a:defRPr sz="1800" kern="1200">
+                <a:solidFill>
+                  <a:schemeClr val="tx1"/>
+                </a:solidFill>
+                <a:latin typeface="+mn-lt"/>
+                <a:ea typeface="+mn-ea"/>
+                <a:cs typeface="+mn-cs"/>
+              </a:defRPr>
+            </a:lvl6pPr>
+            <a:lvl7pPr marL="2971800" indent="-228600" algn="l" defTabSz="914400" rtl="0" eaLnBrk="1" latinLnBrk="0" hangingPunct="1">
+              <a:lnSpc>
+                <a:spcPct val="90000"/>
+              </a:lnSpc>
+              <a:spcBef>
+                <a:spcPts val="500"/>
+              </a:spcBef>
+              <a:buFont typeface="Arial" panose="020B0604020202020204" pitchFamily="34" charset="0"/>
+              <a:buChar char="•"/>
+              <a:defRPr sz="1800" kern="1200">
+                <a:solidFill>
+                  <a:schemeClr val="tx1"/>
+                </a:solidFill>
+                <a:latin typeface="+mn-lt"/>
+                <a:ea typeface="+mn-ea"/>
+                <a:cs typeface="+mn-cs"/>
+              </a:defRPr>
+            </a:lvl7pPr>
+            <a:lvl8pPr marL="3429000" indent="-228600" algn="l" defTabSz="914400" rtl="0" eaLnBrk="1" latinLnBrk="0" hangingPunct="1">
+              <a:lnSpc>
+                <a:spcPct val="90000"/>
+              </a:lnSpc>
+              <a:spcBef>
+                <a:spcPts val="500"/>
+              </a:spcBef>
+              <a:buFont typeface="Arial" panose="020B0604020202020204" pitchFamily="34" charset="0"/>
+              <a:buChar char="•"/>
+              <a:defRPr sz="1800" kern="1200">
+                <a:solidFill>
+                  <a:schemeClr val="tx1"/>
+                </a:solidFill>
+                <a:latin typeface="+mn-lt"/>
+                <a:ea typeface="+mn-ea"/>
+                <a:cs typeface="+mn-cs"/>
+              </a:defRPr>
+            </a:lvl8pPr>
+            <a:lvl9pPr marL="3886200" indent="-228600" algn="l" defTabSz="914400" rtl="0" eaLnBrk="1" latinLnBrk="0" hangingPunct="1">
+              <a:lnSpc>
+                <a:spcPct val="90000"/>
+              </a:lnSpc>
+              <a:spcBef>
+                <a:spcPts val="500"/>
+              </a:spcBef>
+              <a:buFont typeface="Arial" panose="020B0604020202020204" pitchFamily="34" charset="0"/>
+              <a:buChar char="•"/>
+              <a:defRPr sz="1800" kern="1200">
+                <a:solidFill>
+                  <a:schemeClr val="tx1"/>
+                </a:solidFill>
+                <a:latin typeface="+mn-lt"/>
+                <a:ea typeface="+mn-ea"/>
+                <a:cs typeface="+mn-cs"/>
+              </a:defRPr>
+            </a:lvl9pPr>
+          </a:lstStyle>
+          <a:p>
+            <a:r>
+              <a:rPr lang="en-US" sz="2400" dirty="0"/>
+              <a:t>Git: A </a:t>
+            </a:r>
+            <a:r>
+              <a:rPr lang="en-US" sz="2400" b="1" dirty="0"/>
+              <a:t>distributed </a:t>
+            </a:r>
+            <a:r>
+              <a:rPr lang="en-US" sz="2400" dirty="0"/>
+              <a:t>VCS that takes ‘snapshots’ of your project.</a:t>
+            </a:r>
+          </a:p>
+          <a:p>
+            <a:r>
+              <a:rPr lang="en-US" sz="2400" dirty="0"/>
+              <a:t>GitHub: A platform to host &amp; collab on repositories (project).</a:t>
+            </a:r>
+          </a:p>
+        </p:txBody>
+      </p:sp>
+    </p:spTree>
+    <p:extLst>
+      <p:ext uri="{BB962C8B-B14F-4D97-AF65-F5344CB8AC3E}">
+        <p14:creationId xmlns:p14="http://schemas.microsoft.com/office/powerpoint/2010/main" val="1852513965"/>
+      </p:ext>
+    </p:extLst>
+  </p:cSld>
+  <p:clrMapOvr>
+    <a:masterClrMapping/>
+  </p:clrMapOvr>
+</p:sld>
+</file>
+
+<file path=ppt/slides/slide30.xml><?xml version="1.0" encoding="utf-8"?>
 <p:sld xmlns:a="http://schemas.openxmlformats.org/drawingml/2006/main" xmlns:r="http://schemas.openxmlformats.org/officeDocument/2006/relationships" xmlns:p="http://schemas.openxmlformats.org/presentationml/2006/main">
   <p:cSld>
     <p:spTree>
@@ -12038,7 +13230,7 @@
 </p:sld>
 </file>
 
-<file path=ppt/slides/slide29.xml><?xml version="1.0" encoding="utf-8"?>
+<file path=ppt/slides/slide31.xml><?xml version="1.0" encoding="utf-8"?>
 <p:sld xmlns:a="http://schemas.openxmlformats.org/drawingml/2006/main" xmlns:r="http://schemas.openxmlformats.org/officeDocument/2006/relationships" xmlns:p="http://schemas.openxmlformats.org/presentationml/2006/main">
   <p:cSld>
     <p:spTree>
@@ -12090,53 +13282,6 @@
       </p:sp>
       <p:pic>
         <p:nvPicPr>
-          <p:cNvPr id="1026" name="Picture 2" descr="The lifecycle of the status of your files">
-            <a:extLst>
-              <a:ext uri="{FF2B5EF4-FFF2-40B4-BE49-F238E27FC236}">
-                <a16:creationId xmlns:a16="http://schemas.microsoft.com/office/drawing/2014/main" id="{BD24A914-4B8F-402A-85ED-3F6BB8985C56}"/>
-              </a:ext>
-            </a:extLst>
-          </p:cNvPr>
-          <p:cNvPicPr>
-            <a:picLocks noChangeAspect="1" noChangeArrowheads="1"/>
-          </p:cNvPicPr>
-          <p:nvPr/>
-        </p:nvPicPr>
-        <p:blipFill>
-          <a:blip r:embed="rId2">
-            <a:extLst>
-              <a:ext uri="{28A0092B-C50C-407E-A947-70E740481C1C}">
-                <a14:useLocalDpi xmlns:a14="http://schemas.microsoft.com/office/drawing/2010/main" val="0"/>
-              </a:ext>
-            </a:extLst>
-          </a:blip>
-          <a:srcRect/>
-          <a:stretch>
-            <a:fillRect/>
-          </a:stretch>
-        </p:blipFill>
-        <p:spPr bwMode="auto">
-          <a:xfrm>
-            <a:off x="705774" y="1469121"/>
-            <a:ext cx="7620000" cy="3143250"/>
-          </a:xfrm>
-          <a:prstGeom prst="rect">
-            <a:avLst/>
-          </a:prstGeom>
-          <a:noFill/>
-          <a:extLst>
-            <a:ext uri="{909E8E84-426E-40DD-AFC4-6F175D3DCCD1}">
-              <a14:hiddenFill xmlns:a14="http://schemas.microsoft.com/office/drawing/2010/main">
-                <a:solidFill>
-                  <a:srgbClr val="FFFFFF"/>
-                </a:solidFill>
-              </a14:hiddenFill>
-            </a:ext>
-          </a:extLst>
-        </p:spPr>
-      </p:pic>
-      <p:pic>
-        <p:nvPicPr>
           <p:cNvPr id="9" name="Picture 8" descr="Diagram, timeline&#10;&#10;Description automatically generated with medium confidence">
             <a:extLst>
               <a:ext uri="{FF2B5EF4-FFF2-40B4-BE49-F238E27FC236}">
@@ -12150,7 +13295,7 @@
           <p:nvPr/>
         </p:nvPicPr>
         <p:blipFill>
-          <a:blip r:embed="rId3"/>
+          <a:blip r:embed="rId2"/>
           <a:stretch>
             <a:fillRect/>
           </a:stretch>
@@ -12180,7 +13325,7 @@
           <p:nvPr/>
         </p:nvPicPr>
         <p:blipFill>
-          <a:blip r:embed="rId4"/>
+          <a:blip r:embed="rId3"/>
           <a:stretch>
             <a:fillRect/>
           </a:stretch>
@@ -12208,7 +13353,7 @@
 </p:sld>
 </file>
 
-<file path=ppt/slides/slide3.xml><?xml version="1.0" encoding="utf-8"?>
+<file path=ppt/slides/slide32.xml><?xml version="1.0" encoding="utf-8"?>
 <p:sld xmlns:a="http://schemas.openxmlformats.org/drawingml/2006/main" xmlns:r="http://schemas.openxmlformats.org/officeDocument/2006/relationships" xmlns:p="http://schemas.openxmlformats.org/presentationml/2006/main">
   <p:cSld>
     <p:spTree>
@@ -12227,642 +13372,6 @@
       </p:grpSpPr>
       <p:sp>
         <p:nvSpPr>
-          <p:cNvPr id="3" name="Content Placeholder 2">
-            <a:extLst>
-              <a:ext uri="{FF2B5EF4-FFF2-40B4-BE49-F238E27FC236}">
-                <a16:creationId xmlns:a16="http://schemas.microsoft.com/office/drawing/2014/main" id="{6CD1FD88-1DF5-4CB5-97CD-1BF062D3DAAF}"/>
-              </a:ext>
-            </a:extLst>
-          </p:cNvPr>
-          <p:cNvSpPr>
-            <a:spLocks noGrp="1"/>
-          </p:cNvSpPr>
-          <p:nvPr>
-            <p:ph idx="1"/>
-          </p:nvPr>
-        </p:nvSpPr>
-        <p:spPr>
-          <a:xfrm>
-            <a:off x="754310" y="491775"/>
-            <a:ext cx="10515600" cy="4351338"/>
-          </a:xfrm>
-        </p:spPr>
-        <p:txBody>
-          <a:bodyPr/>
-          <a:lstStyle/>
-          <a:p>
-            <a:pPr marL="0" indent="0" algn="ctr">
-              <a:buNone/>
-            </a:pPr>
-            <a:r>
-              <a:rPr lang="en-US" sz="3600" dirty="0">
-                <a:latin typeface="+mj-lt"/>
-              </a:rPr>
-              <a:t>A system that:</a:t>
-            </a:r>
-          </a:p>
-          <a:p>
-            <a:pPr marL="0" indent="0">
-              <a:buNone/>
-            </a:pPr>
-            <a:endParaRPr lang="en-US" dirty="0">
-              <a:latin typeface="+mj-lt"/>
-            </a:endParaRPr>
-          </a:p>
-        </p:txBody>
-      </p:sp>
-      <p:sp>
-        <p:nvSpPr>
-          <p:cNvPr id="4" name="Rectangle: Rounded Corners 3">
-            <a:extLst>
-              <a:ext uri="{FF2B5EF4-FFF2-40B4-BE49-F238E27FC236}">
-                <a16:creationId xmlns:a16="http://schemas.microsoft.com/office/drawing/2014/main" id="{271A5690-00A1-4EBD-BA23-2FFBBEBB9A86}"/>
-              </a:ext>
-            </a:extLst>
-          </p:cNvPr>
-          <p:cNvSpPr/>
-          <p:nvPr/>
-        </p:nvSpPr>
-        <p:spPr>
-          <a:xfrm>
-            <a:off x="1165370" y="1627464"/>
-            <a:ext cx="1888261" cy="1563018"/>
-          </a:xfrm>
-          <a:prstGeom prst="roundRect">
-            <a:avLst/>
-          </a:prstGeom>
-          <a:solidFill>
-            <a:schemeClr val="bg2"/>
-          </a:solidFill>
-          <a:ln>
-            <a:noFill/>
-          </a:ln>
-        </p:spPr>
-        <p:style>
-          <a:lnRef idx="2">
-            <a:schemeClr val="accent1">
-              <a:shade val="50000"/>
-            </a:schemeClr>
-          </a:lnRef>
-          <a:fillRef idx="1">
-            <a:schemeClr val="accent1"/>
-          </a:fillRef>
-          <a:effectRef idx="0">
-            <a:schemeClr val="accent1"/>
-          </a:effectRef>
-          <a:fontRef idx="minor">
-            <a:schemeClr val="lt1"/>
-          </a:fontRef>
-        </p:style>
-        <p:txBody>
-          <a:bodyPr rtlCol="0" anchor="ctr"/>
-          <a:lstStyle/>
-          <a:p>
-            <a:pPr algn="ctr"/>
-            <a:r>
-              <a:rPr lang="en-MY" dirty="0">
-                <a:solidFill>
-                  <a:schemeClr val="tx1"/>
-                </a:solidFill>
-              </a:rPr>
-              <a:t>Records changes made</a:t>
-            </a:r>
-          </a:p>
-        </p:txBody>
-      </p:sp>
-      <p:sp>
-        <p:nvSpPr>
-          <p:cNvPr id="7" name="Rectangle: Rounded Corners 6">
-            <a:extLst>
-              <a:ext uri="{FF2B5EF4-FFF2-40B4-BE49-F238E27FC236}">
-                <a16:creationId xmlns:a16="http://schemas.microsoft.com/office/drawing/2014/main" id="{00AEEC39-7F46-4F51-B127-BBA8315603FF}"/>
-              </a:ext>
-            </a:extLst>
-          </p:cNvPr>
-          <p:cNvSpPr/>
-          <p:nvPr/>
-        </p:nvSpPr>
-        <p:spPr>
-          <a:xfrm>
-            <a:off x="3817689" y="1627464"/>
-            <a:ext cx="1888261" cy="1563018"/>
-          </a:xfrm>
-          <a:prstGeom prst="roundRect">
-            <a:avLst/>
-          </a:prstGeom>
-          <a:solidFill>
-            <a:schemeClr val="bg2"/>
-          </a:solidFill>
-          <a:ln>
-            <a:noFill/>
-          </a:ln>
-        </p:spPr>
-        <p:style>
-          <a:lnRef idx="2">
-            <a:schemeClr val="accent6">
-              <a:shade val="50000"/>
-            </a:schemeClr>
-          </a:lnRef>
-          <a:fillRef idx="1">
-            <a:schemeClr val="accent6"/>
-          </a:fillRef>
-          <a:effectRef idx="0">
-            <a:schemeClr val="accent6"/>
-          </a:effectRef>
-          <a:fontRef idx="minor">
-            <a:schemeClr val="lt1"/>
-          </a:fontRef>
-        </p:style>
-        <p:txBody>
-          <a:bodyPr rtlCol="0" anchor="ctr"/>
-          <a:lstStyle/>
-          <a:p>
-            <a:pPr algn="ctr"/>
-            <a:r>
-              <a:rPr lang="en-MY" dirty="0">
-                <a:solidFill>
-                  <a:schemeClr val="tx1"/>
-                </a:solidFill>
-              </a:rPr>
-              <a:t>Can recover previous versions</a:t>
-            </a:r>
-          </a:p>
-        </p:txBody>
-      </p:sp>
-      <p:sp>
-        <p:nvSpPr>
-          <p:cNvPr id="8" name="Rectangle: Rounded Corners 7">
-            <a:extLst>
-              <a:ext uri="{FF2B5EF4-FFF2-40B4-BE49-F238E27FC236}">
-                <a16:creationId xmlns:a16="http://schemas.microsoft.com/office/drawing/2014/main" id="{80E687EE-9A7E-4C1F-949E-E87410C1267F}"/>
-              </a:ext>
-            </a:extLst>
-          </p:cNvPr>
-          <p:cNvSpPr/>
-          <p:nvPr/>
-        </p:nvSpPr>
-        <p:spPr>
-          <a:xfrm>
-            <a:off x="6470008" y="1627464"/>
-            <a:ext cx="1888261" cy="1563018"/>
-          </a:xfrm>
-          <a:prstGeom prst="roundRect">
-            <a:avLst/>
-          </a:prstGeom>
-          <a:solidFill>
-            <a:schemeClr val="accent6"/>
-          </a:solidFill>
-          <a:ln>
-            <a:noFill/>
-          </a:ln>
-        </p:spPr>
-        <p:style>
-          <a:lnRef idx="1">
-            <a:schemeClr val="accent4"/>
-          </a:lnRef>
-          <a:fillRef idx="3">
-            <a:schemeClr val="accent4"/>
-          </a:fillRef>
-          <a:effectRef idx="2">
-            <a:schemeClr val="accent4"/>
-          </a:effectRef>
-          <a:fontRef idx="minor">
-            <a:schemeClr val="lt1"/>
-          </a:fontRef>
-        </p:style>
-        <p:txBody>
-          <a:bodyPr rtlCol="0" anchor="ctr"/>
-          <a:lstStyle/>
-          <a:p>
-            <a:pPr algn="ctr"/>
-            <a:r>
-              <a:rPr lang="en-MY" dirty="0">
-                <a:solidFill>
-                  <a:schemeClr val="bg2"/>
-                </a:solidFill>
-              </a:rPr>
-              <a:t>Allows us to work independently in a team</a:t>
-            </a:r>
-          </a:p>
-        </p:txBody>
-      </p:sp>
-      <p:sp>
-        <p:nvSpPr>
-          <p:cNvPr id="9" name="Rectangle: Rounded Corners 8">
-            <a:extLst>
-              <a:ext uri="{FF2B5EF4-FFF2-40B4-BE49-F238E27FC236}">
-                <a16:creationId xmlns:a16="http://schemas.microsoft.com/office/drawing/2014/main" id="{61A158EC-5DDB-4778-BA26-5238F108FB5C}"/>
-              </a:ext>
-            </a:extLst>
-          </p:cNvPr>
-          <p:cNvSpPr/>
-          <p:nvPr/>
-        </p:nvSpPr>
-        <p:spPr>
-          <a:xfrm>
-            <a:off x="9122327" y="1627464"/>
-            <a:ext cx="1888261" cy="1563018"/>
-          </a:xfrm>
-          <a:prstGeom prst="roundRect">
-            <a:avLst/>
-          </a:prstGeom>
-          <a:solidFill>
-            <a:schemeClr val="accent6"/>
-          </a:solidFill>
-          <a:ln>
-            <a:noFill/>
-          </a:ln>
-        </p:spPr>
-        <p:style>
-          <a:lnRef idx="1">
-            <a:schemeClr val="accent1"/>
-          </a:lnRef>
-          <a:fillRef idx="3">
-            <a:schemeClr val="accent1"/>
-          </a:fillRef>
-          <a:effectRef idx="2">
-            <a:schemeClr val="accent1"/>
-          </a:effectRef>
-          <a:fontRef idx="minor">
-            <a:schemeClr val="lt1"/>
-          </a:fontRef>
-        </p:style>
-        <p:txBody>
-          <a:bodyPr rtlCol="0" anchor="ctr"/>
-          <a:lstStyle/>
-          <a:p>
-            <a:pPr algn="ctr"/>
-            <a:r>
-              <a:rPr lang="en-MY" dirty="0">
-                <a:solidFill>
-                  <a:schemeClr val="bg2"/>
-                </a:solidFill>
-              </a:rPr>
-              <a:t>Stores files in one place</a:t>
-            </a:r>
-          </a:p>
-        </p:txBody>
-      </p:sp>
-      <p:sp>
-        <p:nvSpPr>
-          <p:cNvPr id="11" name="Title 1">
-            <a:extLst>
-              <a:ext uri="{FF2B5EF4-FFF2-40B4-BE49-F238E27FC236}">
-                <a16:creationId xmlns:a16="http://schemas.microsoft.com/office/drawing/2014/main" id="{BDDB32F0-D524-4A32-8A3E-88EC14C9D5FC}"/>
-              </a:ext>
-            </a:extLst>
-          </p:cNvPr>
-          <p:cNvSpPr txBox="1">
-            <a:spLocks/>
-          </p:cNvSpPr>
-          <p:nvPr/>
-        </p:nvSpPr>
-        <p:spPr>
-          <a:xfrm>
-            <a:off x="4455515" y="3875735"/>
-            <a:ext cx="3280969" cy="711142"/>
-          </a:xfrm>
-          <a:prstGeom prst="rect">
-            <a:avLst/>
-          </a:prstGeom>
-        </p:spPr>
-        <p:txBody>
-          <a:bodyPr vert="horz" lIns="91440" tIns="45720" rIns="91440" bIns="45720" rtlCol="0" anchor="ctr">
-            <a:noAutofit/>
-          </a:bodyPr>
-          <a:lstStyle>
-            <a:lvl1pPr algn="l" defTabSz="914400" rtl="0" eaLnBrk="1" latinLnBrk="0" hangingPunct="1">
-              <a:lnSpc>
-                <a:spcPct val="90000"/>
-              </a:lnSpc>
-              <a:spcBef>
-                <a:spcPct val="0"/>
-              </a:spcBef>
-              <a:buNone/>
-              <a:defRPr sz="4400" kern="1200">
-                <a:solidFill>
-                  <a:schemeClr val="bg1"/>
-                </a:solidFill>
-                <a:latin typeface="+mj-lt"/>
-                <a:ea typeface="+mj-ea"/>
-                <a:cs typeface="+mj-cs"/>
-              </a:defRPr>
-            </a:lvl1pPr>
-          </a:lstStyle>
-          <a:p>
-            <a:pPr algn="ctr"/>
-            <a:r>
-              <a:rPr lang="en-US" sz="3600" dirty="0"/>
-              <a:t>Introducing</a:t>
-            </a:r>
-          </a:p>
-        </p:txBody>
-      </p:sp>
-      <p:pic>
-        <p:nvPicPr>
-          <p:cNvPr id="4100" name="Picture 4" descr="Git and Github: A Beginner's Guide">
-            <a:extLst>
-              <a:ext uri="{FF2B5EF4-FFF2-40B4-BE49-F238E27FC236}">
-                <a16:creationId xmlns:a16="http://schemas.microsoft.com/office/drawing/2014/main" id="{3A337843-39E4-4121-93B3-8A13AB6A5E48}"/>
-              </a:ext>
-            </a:extLst>
-          </p:cNvPr>
-          <p:cNvPicPr>
-            <a:picLocks noChangeAspect="1" noChangeArrowheads="1"/>
-          </p:cNvPicPr>
-          <p:nvPr/>
-        </p:nvPicPr>
-        <p:blipFill rotWithShape="1">
-          <a:blip r:embed="rId2">
-            <a:extLst>
-              <a:ext uri="{28A0092B-C50C-407E-A947-70E740481C1C}">
-                <a14:useLocalDpi xmlns:a14="http://schemas.microsoft.com/office/drawing/2010/main" val="0"/>
-              </a:ext>
-            </a:extLst>
-          </a:blip>
-          <a:srcRect l="7873" t="14309" r="8197" b="21632"/>
-          <a:stretch/>
-        </p:blipFill>
-        <p:spPr bwMode="auto">
-          <a:xfrm>
-            <a:off x="477841" y="4903247"/>
-            <a:ext cx="3263317" cy="1388496"/>
-          </a:xfrm>
-          <a:prstGeom prst="rect">
-            <a:avLst/>
-          </a:prstGeom>
-          <a:noFill/>
-          <a:extLst>
-            <a:ext uri="{909E8E84-426E-40DD-AFC4-6F175D3DCCD1}">
-              <a14:hiddenFill xmlns:a14="http://schemas.microsoft.com/office/drawing/2010/main">
-                <a:solidFill>
-                  <a:srgbClr val="FFFFFF"/>
-                </a:solidFill>
-              </a14:hiddenFill>
-            </a:ext>
-          </a:extLst>
-        </p:spPr>
-      </p:pic>
-      <p:sp>
-        <p:nvSpPr>
-          <p:cNvPr id="13" name="Content Placeholder 2">
-            <a:extLst>
-              <a:ext uri="{FF2B5EF4-FFF2-40B4-BE49-F238E27FC236}">
-                <a16:creationId xmlns:a16="http://schemas.microsoft.com/office/drawing/2014/main" id="{9B0E902E-D838-4A61-A3B3-8901FC18962B}"/>
-              </a:ext>
-            </a:extLst>
-          </p:cNvPr>
-          <p:cNvSpPr txBox="1">
-            <a:spLocks/>
-          </p:cNvSpPr>
-          <p:nvPr/>
-        </p:nvSpPr>
-        <p:spPr>
-          <a:xfrm>
-            <a:off x="4035103" y="5041782"/>
-            <a:ext cx="7592037" cy="1388496"/>
-          </a:xfrm>
-          <a:prstGeom prst="rect">
-            <a:avLst/>
-          </a:prstGeom>
-        </p:spPr>
-        <p:txBody>
-          <a:bodyPr vert="horz" lIns="91440" tIns="45720" rIns="91440" bIns="45720" rtlCol="0">
-            <a:normAutofit fontScale="92500"/>
-          </a:bodyPr>
-          <a:lstStyle>
-            <a:lvl1pPr marL="228600" indent="-228600" algn="l" defTabSz="914400" rtl="0" eaLnBrk="1" latinLnBrk="0" hangingPunct="1">
-              <a:lnSpc>
-                <a:spcPct val="90000"/>
-              </a:lnSpc>
-              <a:spcBef>
-                <a:spcPts val="1000"/>
-              </a:spcBef>
-              <a:buClr>
-                <a:schemeClr val="accent4"/>
-              </a:buClr>
-              <a:buFont typeface="Wingdings" panose="05000000000000000000" pitchFamily="2" charset="2"/>
-              <a:buChar char="§"/>
-              <a:defRPr sz="2800" kern="1200">
-                <a:solidFill>
-                  <a:schemeClr val="bg1"/>
-                </a:solidFill>
-                <a:latin typeface="+mn-lt"/>
-                <a:ea typeface="+mn-ea"/>
-                <a:cs typeface="+mn-cs"/>
-              </a:defRPr>
-            </a:lvl1pPr>
-            <a:lvl2pPr marL="685800" indent="-228600" algn="l" defTabSz="914400" rtl="0" eaLnBrk="1" latinLnBrk="0" hangingPunct="1">
-              <a:lnSpc>
-                <a:spcPct val="90000"/>
-              </a:lnSpc>
-              <a:spcBef>
-                <a:spcPts val="500"/>
-              </a:spcBef>
-              <a:buClr>
-                <a:schemeClr val="accent4"/>
-              </a:buClr>
-              <a:buFont typeface="Wingdings" panose="05000000000000000000" pitchFamily="2" charset="2"/>
-              <a:buChar char="§"/>
-              <a:defRPr sz="2400" kern="1200">
-                <a:solidFill>
-                  <a:schemeClr val="bg1"/>
-                </a:solidFill>
-                <a:latin typeface="+mn-lt"/>
-                <a:ea typeface="+mn-ea"/>
-                <a:cs typeface="+mn-cs"/>
-              </a:defRPr>
-            </a:lvl2pPr>
-            <a:lvl3pPr marL="1143000" indent="-228600" algn="l" defTabSz="914400" rtl="0" eaLnBrk="1" latinLnBrk="0" hangingPunct="1">
-              <a:lnSpc>
-                <a:spcPct val="90000"/>
-              </a:lnSpc>
-              <a:spcBef>
-                <a:spcPts val="500"/>
-              </a:spcBef>
-              <a:buClr>
-                <a:schemeClr val="accent4"/>
-              </a:buClr>
-              <a:buFont typeface="Wingdings" panose="05000000000000000000" pitchFamily="2" charset="2"/>
-              <a:buChar char="§"/>
-              <a:defRPr sz="2000" kern="1200">
-                <a:solidFill>
-                  <a:schemeClr val="bg1"/>
-                </a:solidFill>
-                <a:latin typeface="+mn-lt"/>
-                <a:ea typeface="+mn-ea"/>
-                <a:cs typeface="+mn-cs"/>
-              </a:defRPr>
-            </a:lvl3pPr>
-            <a:lvl4pPr marL="1600200" indent="-228600" algn="l" defTabSz="914400" rtl="0" eaLnBrk="1" latinLnBrk="0" hangingPunct="1">
-              <a:lnSpc>
-                <a:spcPct val="90000"/>
-              </a:lnSpc>
-              <a:spcBef>
-                <a:spcPts val="500"/>
-              </a:spcBef>
-              <a:buClr>
-                <a:schemeClr val="accent4"/>
-              </a:buClr>
-              <a:buFont typeface="Wingdings" panose="05000000000000000000" pitchFamily="2" charset="2"/>
-              <a:buChar char="§"/>
-              <a:defRPr sz="1800" kern="1200">
-                <a:solidFill>
-                  <a:schemeClr val="bg1"/>
-                </a:solidFill>
-                <a:latin typeface="+mn-lt"/>
-                <a:ea typeface="+mn-ea"/>
-                <a:cs typeface="+mn-cs"/>
-              </a:defRPr>
-            </a:lvl4pPr>
-            <a:lvl5pPr marL="2057400" indent="-228600" algn="l" defTabSz="914400" rtl="0" eaLnBrk="1" latinLnBrk="0" hangingPunct="1">
-              <a:lnSpc>
-                <a:spcPct val="90000"/>
-              </a:lnSpc>
-              <a:spcBef>
-                <a:spcPts val="500"/>
-              </a:spcBef>
-              <a:buClr>
-                <a:schemeClr val="accent4"/>
-              </a:buClr>
-              <a:buFont typeface="Wingdings" panose="05000000000000000000" pitchFamily="2" charset="2"/>
-              <a:buChar char="§"/>
-              <a:defRPr sz="1800" kern="1200">
-                <a:solidFill>
-                  <a:schemeClr val="bg1"/>
-                </a:solidFill>
-                <a:latin typeface="+mn-lt"/>
-                <a:ea typeface="+mn-ea"/>
-                <a:cs typeface="+mn-cs"/>
-              </a:defRPr>
-            </a:lvl5pPr>
-            <a:lvl6pPr marL="2514600" indent="-228600" algn="l" defTabSz="914400" rtl="0" eaLnBrk="1" latinLnBrk="0" hangingPunct="1">
-              <a:lnSpc>
-                <a:spcPct val="90000"/>
-              </a:lnSpc>
-              <a:spcBef>
-                <a:spcPts val="500"/>
-              </a:spcBef>
-              <a:buFont typeface="Arial" panose="020B0604020202020204" pitchFamily="34" charset="0"/>
-              <a:buChar char="•"/>
-              <a:defRPr sz="1800" kern="1200">
-                <a:solidFill>
-                  <a:schemeClr val="tx1"/>
-                </a:solidFill>
-                <a:latin typeface="+mn-lt"/>
-                <a:ea typeface="+mn-ea"/>
-                <a:cs typeface="+mn-cs"/>
-              </a:defRPr>
-            </a:lvl6pPr>
-            <a:lvl7pPr marL="2971800" indent="-228600" algn="l" defTabSz="914400" rtl="0" eaLnBrk="1" latinLnBrk="0" hangingPunct="1">
-              <a:lnSpc>
-                <a:spcPct val="90000"/>
-              </a:lnSpc>
-              <a:spcBef>
-                <a:spcPts val="500"/>
-              </a:spcBef>
-              <a:buFont typeface="Arial" panose="020B0604020202020204" pitchFamily="34" charset="0"/>
-              <a:buChar char="•"/>
-              <a:defRPr sz="1800" kern="1200">
-                <a:solidFill>
-                  <a:schemeClr val="tx1"/>
-                </a:solidFill>
-                <a:latin typeface="+mn-lt"/>
-                <a:ea typeface="+mn-ea"/>
-                <a:cs typeface="+mn-cs"/>
-              </a:defRPr>
-            </a:lvl7pPr>
-            <a:lvl8pPr marL="3429000" indent="-228600" algn="l" defTabSz="914400" rtl="0" eaLnBrk="1" latinLnBrk="0" hangingPunct="1">
-              <a:lnSpc>
-                <a:spcPct val="90000"/>
-              </a:lnSpc>
-              <a:spcBef>
-                <a:spcPts val="500"/>
-              </a:spcBef>
-              <a:buFont typeface="Arial" panose="020B0604020202020204" pitchFamily="34" charset="0"/>
-              <a:buChar char="•"/>
-              <a:defRPr sz="1800" kern="1200">
-                <a:solidFill>
-                  <a:schemeClr val="tx1"/>
-                </a:solidFill>
-                <a:latin typeface="+mn-lt"/>
-                <a:ea typeface="+mn-ea"/>
-                <a:cs typeface="+mn-cs"/>
-              </a:defRPr>
-            </a:lvl8pPr>
-            <a:lvl9pPr marL="3886200" indent="-228600" algn="l" defTabSz="914400" rtl="0" eaLnBrk="1" latinLnBrk="0" hangingPunct="1">
-              <a:lnSpc>
-                <a:spcPct val="90000"/>
-              </a:lnSpc>
-              <a:spcBef>
-                <a:spcPts val="500"/>
-              </a:spcBef>
-              <a:buFont typeface="Arial" panose="020B0604020202020204" pitchFamily="34" charset="0"/>
-              <a:buChar char="•"/>
-              <a:defRPr sz="1800" kern="1200">
-                <a:solidFill>
-                  <a:schemeClr val="tx1"/>
-                </a:solidFill>
-                <a:latin typeface="+mn-lt"/>
-                <a:ea typeface="+mn-ea"/>
-                <a:cs typeface="+mn-cs"/>
-              </a:defRPr>
-            </a:lvl9pPr>
-          </a:lstStyle>
-          <a:p>
-            <a:r>
-              <a:rPr lang="en-US" sz="2400" dirty="0"/>
-              <a:t>Git: A </a:t>
-            </a:r>
-            <a:r>
-              <a:rPr lang="en-US" sz="2400" b="1" dirty="0"/>
-              <a:t>distributed </a:t>
-            </a:r>
-            <a:r>
-              <a:rPr lang="en-US" sz="2400" dirty="0"/>
-              <a:t>VCS that takes ‘snapshots’ of your project.</a:t>
-            </a:r>
-          </a:p>
-          <a:p>
-            <a:r>
-              <a:rPr lang="en-US" sz="2400" dirty="0"/>
-              <a:t>GitHub: A platform to host &amp; collab on repositories (project).</a:t>
-            </a:r>
-          </a:p>
-        </p:txBody>
-      </p:sp>
-    </p:spTree>
-    <p:extLst>
-      <p:ext uri="{BB962C8B-B14F-4D97-AF65-F5344CB8AC3E}">
-        <p14:creationId xmlns:p14="http://schemas.microsoft.com/office/powerpoint/2010/main" val="1852513965"/>
-      </p:ext>
-    </p:extLst>
-  </p:cSld>
-  <p:clrMapOvr>
-    <a:masterClrMapping/>
-  </p:clrMapOvr>
-</p:sld>
-</file>
-
-<file path=ppt/slides/slide30.xml><?xml version="1.0" encoding="utf-8"?>
-<p:sld xmlns:a="http://schemas.openxmlformats.org/drawingml/2006/main" xmlns:r="http://schemas.openxmlformats.org/officeDocument/2006/relationships" xmlns:p="http://schemas.openxmlformats.org/presentationml/2006/main">
-  <p:cSld>
-    <p:spTree>
-      <p:nvGrpSpPr>
-        <p:cNvPr id="1" name=""/>
-        <p:cNvGrpSpPr/>
-        <p:nvPr/>
-      </p:nvGrpSpPr>
-      <p:grpSpPr>
-        <a:xfrm>
-          <a:off x="0" y="0"/>
-          <a:ext cx="0" cy="0"/>
-          <a:chOff x="0" y="0"/>
-          <a:chExt cx="0" cy="0"/>
-        </a:xfrm>
-      </p:grpSpPr>
-      <p:sp>
-        <p:nvSpPr>
           <p:cNvPr id="14" name="Title 1">
             <a:extLst>
               <a:ext uri="{FF2B5EF4-FFF2-40B4-BE49-F238E27FC236}">
@@ -12896,10 +13405,10 @@
       </p:sp>
       <p:pic>
         <p:nvPicPr>
-          <p:cNvPr id="3" name="Picture 2" descr="Text&#10;&#10;Description automatically generated">
-            <a:extLst>
-              <a:ext uri="{FF2B5EF4-FFF2-40B4-BE49-F238E27FC236}">
-                <a16:creationId xmlns:a16="http://schemas.microsoft.com/office/drawing/2014/main" id="{A02EFD62-B143-41FA-9463-65616AAD8835}"/>
+          <p:cNvPr id="5" name="Picture 4" descr="Graphical user interface, text&#10;&#10;Description automatically generated">
+            <a:extLst>
+              <a:ext uri="{FF2B5EF4-FFF2-40B4-BE49-F238E27FC236}">
+                <a16:creationId xmlns:a16="http://schemas.microsoft.com/office/drawing/2014/main" id="{AA83C96B-847E-43C0-A4CD-F59B265238AB}"/>
               </a:ext>
             </a:extLst>
           </p:cNvPr>
@@ -12916,37 +13425,7 @@
         </p:blipFill>
         <p:spPr>
           <a:xfrm>
-            <a:off x="-25400" y="700418"/>
-            <a:ext cx="6609518" cy="3118829"/>
-          </a:xfrm>
-          <a:prstGeom prst="rect">
-            <a:avLst/>
-          </a:prstGeom>
-        </p:spPr>
-      </p:pic>
-      <p:pic>
-        <p:nvPicPr>
-          <p:cNvPr id="5" name="Picture 4" descr="Graphical user interface, text&#10;&#10;Description automatically generated">
-            <a:extLst>
-              <a:ext uri="{FF2B5EF4-FFF2-40B4-BE49-F238E27FC236}">
-                <a16:creationId xmlns:a16="http://schemas.microsoft.com/office/drawing/2014/main" id="{AA83C96B-847E-43C0-A4CD-F59B265238AB}"/>
-              </a:ext>
-            </a:extLst>
-          </p:cNvPr>
-          <p:cNvPicPr>
-            <a:picLocks noChangeAspect="1"/>
-          </p:cNvPicPr>
-          <p:nvPr/>
-        </p:nvPicPr>
-        <p:blipFill>
-          <a:blip r:embed="rId3"/>
-          <a:stretch>
-            <a:fillRect/>
-          </a:stretch>
-        </p:blipFill>
-        <p:spPr>
-          <a:xfrm>
-            <a:off x="0" y="2787588"/>
+            <a:off x="0" y="806339"/>
             <a:ext cx="7074398" cy="2863141"/>
           </a:xfrm>
           <a:prstGeom prst="rect">
@@ -12967,7 +13446,7 @@
 </p:sld>
 </file>
 
-<file path=ppt/slides/slide31.xml><?xml version="1.0" encoding="utf-8"?>
+<file path=ppt/slides/slide33.xml><?xml version="1.0" encoding="utf-8"?>
 <p:sld xmlns:a="http://schemas.openxmlformats.org/drawingml/2006/main" xmlns:r="http://schemas.openxmlformats.org/officeDocument/2006/relationships" xmlns:p="http://schemas.openxmlformats.org/presentationml/2006/main">
   <p:cSld>
     <p:spTree>
@@ -13814,6 +14293,36 @@
           </a:prstGeom>
         </p:spPr>
       </p:pic>
+      <p:pic>
+        <p:nvPicPr>
+          <p:cNvPr id="7" name="Picture 6" descr="Graphical user interface, text, application&#10;&#10;Description automatically generated">
+            <a:extLst>
+              <a:ext uri="{FF2B5EF4-FFF2-40B4-BE49-F238E27FC236}">
+                <a16:creationId xmlns:a16="http://schemas.microsoft.com/office/drawing/2014/main" id="{ABCE9D89-C8A6-49BD-B287-5C71BD14FAF0}"/>
+              </a:ext>
+            </a:extLst>
+          </p:cNvPr>
+          <p:cNvPicPr>
+            <a:picLocks noChangeAspect="1"/>
+          </p:cNvPicPr>
+          <p:nvPr/>
+        </p:nvPicPr>
+        <p:blipFill>
+          <a:blip r:embed="rId4"/>
+          <a:stretch>
+            <a:fillRect/>
+          </a:stretch>
+        </p:blipFill>
+        <p:spPr>
+          <a:xfrm>
+            <a:off x="7583165" y="-437518"/>
+            <a:ext cx="4962525" cy="2845808"/>
+          </a:xfrm>
+          <a:prstGeom prst="rect">
+            <a:avLst/>
+          </a:prstGeom>
+        </p:spPr>
+      </p:pic>
     </p:spTree>
     <p:extLst>
       <p:ext uri="{BB962C8B-B14F-4D97-AF65-F5344CB8AC3E}">
@@ -13828,345 +14337,6 @@
 </file>
 
 <file path=ppt/slides/slide6.xml><?xml version="1.0" encoding="utf-8"?>
-<p:sld xmlns:a="http://schemas.openxmlformats.org/drawingml/2006/main" xmlns:r="http://schemas.openxmlformats.org/officeDocument/2006/relationships" xmlns:p="http://schemas.openxmlformats.org/presentationml/2006/main">
-  <p:cSld>
-    <p:spTree>
-      <p:nvGrpSpPr>
-        <p:cNvPr id="1" name=""/>
-        <p:cNvGrpSpPr/>
-        <p:nvPr/>
-      </p:nvGrpSpPr>
-      <p:grpSpPr>
-        <a:xfrm>
-          <a:off x="0" y="0"/>
-          <a:ext cx="0" cy="0"/>
-          <a:chOff x="0" y="0"/>
-          <a:chExt cx="0" cy="0"/>
-        </a:xfrm>
-      </p:grpSpPr>
-      <p:sp>
-        <p:nvSpPr>
-          <p:cNvPr id="2" name="Title 1">
-            <a:extLst>
-              <a:ext uri="{FF2B5EF4-FFF2-40B4-BE49-F238E27FC236}">
-                <a16:creationId xmlns:a16="http://schemas.microsoft.com/office/drawing/2014/main" id="{8B2AD4E1-0643-4C88-9E49-C2724AEB3568}"/>
-              </a:ext>
-            </a:extLst>
-          </p:cNvPr>
-          <p:cNvSpPr>
-            <a:spLocks noGrp="1"/>
-          </p:cNvSpPr>
-          <p:nvPr>
-            <p:ph type="title"/>
-          </p:nvPr>
-        </p:nvSpPr>
-        <p:spPr/>
-        <p:txBody>
-          <a:bodyPr/>
-          <a:lstStyle/>
-          <a:p>
-            <a:r>
-              <a:rPr lang="en-US" dirty="0"/>
-              <a:t>Cloning an existing repo</a:t>
-            </a:r>
-          </a:p>
-        </p:txBody>
-      </p:sp>
-      <p:sp>
-        <p:nvSpPr>
-          <p:cNvPr id="3" name="Content Placeholder 2">
-            <a:extLst>
-              <a:ext uri="{FF2B5EF4-FFF2-40B4-BE49-F238E27FC236}">
-                <a16:creationId xmlns:a16="http://schemas.microsoft.com/office/drawing/2014/main" id="{F8D322E9-A7EC-465F-93FE-BAA394728626}"/>
-              </a:ext>
-            </a:extLst>
-          </p:cNvPr>
-          <p:cNvSpPr>
-            <a:spLocks noGrp="1"/>
-          </p:cNvSpPr>
-          <p:nvPr>
-            <p:ph idx="1"/>
-          </p:nvPr>
-        </p:nvSpPr>
-        <p:spPr/>
-        <p:txBody>
-          <a:bodyPr/>
-          <a:lstStyle/>
-          <a:p>
-            <a:r>
-              <a:rPr lang="en-US" dirty="0"/>
-              <a:t>A full copy of nearly all data is retrieved </a:t>
-            </a:r>
-          </a:p>
-          <a:p>
-            <a:r>
-              <a:rPr lang="en-US" dirty="0"/>
-              <a:t>Includes all versions of the project</a:t>
-            </a:r>
-          </a:p>
-        </p:txBody>
-      </p:sp>
-      <p:pic>
-        <p:nvPicPr>
-          <p:cNvPr id="15" name="Picture 14" descr="Text&#10;&#10;Description automatically generated">
-            <a:extLst>
-              <a:ext uri="{FF2B5EF4-FFF2-40B4-BE49-F238E27FC236}">
-                <a16:creationId xmlns:a16="http://schemas.microsoft.com/office/drawing/2014/main" id="{F7C5C152-FF48-4239-8FCB-500A0A242A93}"/>
-              </a:ext>
-            </a:extLst>
-          </p:cNvPr>
-          <p:cNvPicPr>
-            <a:picLocks noChangeAspect="1"/>
-          </p:cNvPicPr>
-          <p:nvPr/>
-        </p:nvPicPr>
-        <p:blipFill>
-          <a:blip r:embed="rId2"/>
-          <a:stretch>
-            <a:fillRect/>
-          </a:stretch>
-        </p:blipFill>
-        <p:spPr>
-          <a:xfrm>
-            <a:off x="-176478" y="2371382"/>
-            <a:ext cx="8574754" cy="4326282"/>
-          </a:xfrm>
-          <a:prstGeom prst="rect">
-            <a:avLst/>
-          </a:prstGeom>
-        </p:spPr>
-      </p:pic>
-      <p:sp>
-        <p:nvSpPr>
-          <p:cNvPr id="16" name="Content Placeholder 2">
-            <a:extLst>
-              <a:ext uri="{FF2B5EF4-FFF2-40B4-BE49-F238E27FC236}">
-                <a16:creationId xmlns:a16="http://schemas.microsoft.com/office/drawing/2014/main" id="{EF31A08F-C129-44EC-8C6C-C30E36BA76F1}"/>
-              </a:ext>
-            </a:extLst>
-          </p:cNvPr>
-          <p:cNvSpPr txBox="1">
-            <a:spLocks/>
-          </p:cNvSpPr>
-          <p:nvPr/>
-        </p:nvSpPr>
-        <p:spPr>
-          <a:xfrm>
-            <a:off x="8706853" y="3577388"/>
-            <a:ext cx="2646947" cy="1548149"/>
-          </a:xfrm>
-          <a:prstGeom prst="rect">
-            <a:avLst/>
-          </a:prstGeom>
-        </p:spPr>
-        <p:txBody>
-          <a:bodyPr vert="horz" lIns="91440" tIns="45720" rIns="91440" bIns="45720" rtlCol="0">
-            <a:normAutofit/>
-          </a:bodyPr>
-          <a:lstStyle>
-            <a:lvl1pPr marL="228600" indent="-228600" algn="l" defTabSz="914400" rtl="0" eaLnBrk="1" latinLnBrk="0" hangingPunct="1">
-              <a:lnSpc>
-                <a:spcPct val="90000"/>
-              </a:lnSpc>
-              <a:spcBef>
-                <a:spcPts val="1000"/>
-              </a:spcBef>
-              <a:buClr>
-                <a:schemeClr val="accent5"/>
-              </a:buClr>
-              <a:buFont typeface="Wingdings" panose="05000000000000000000" pitchFamily="2" charset="2"/>
-              <a:buChar char="§"/>
-              <a:defRPr sz="2800" kern="1200">
-                <a:solidFill>
-                  <a:schemeClr val="bg1"/>
-                </a:solidFill>
-                <a:latin typeface="+mn-lt"/>
-                <a:ea typeface="+mn-ea"/>
-                <a:cs typeface="+mn-cs"/>
-              </a:defRPr>
-            </a:lvl1pPr>
-            <a:lvl2pPr marL="685800" indent="-228600" algn="l" defTabSz="914400" rtl="0" eaLnBrk="1" latinLnBrk="0" hangingPunct="1">
-              <a:lnSpc>
-                <a:spcPct val="90000"/>
-              </a:lnSpc>
-              <a:spcBef>
-                <a:spcPts val="500"/>
-              </a:spcBef>
-              <a:buClr>
-                <a:schemeClr val="accent5"/>
-              </a:buClr>
-              <a:buFont typeface="Wingdings" panose="05000000000000000000" pitchFamily="2" charset="2"/>
-              <a:buChar char="§"/>
-              <a:defRPr sz="2400" kern="1200">
-                <a:solidFill>
-                  <a:schemeClr val="bg1"/>
-                </a:solidFill>
-                <a:latin typeface="+mn-lt"/>
-                <a:ea typeface="+mn-ea"/>
-                <a:cs typeface="+mn-cs"/>
-              </a:defRPr>
-            </a:lvl2pPr>
-            <a:lvl3pPr marL="1143000" indent="-228600" algn="l" defTabSz="914400" rtl="0" eaLnBrk="1" latinLnBrk="0" hangingPunct="1">
-              <a:lnSpc>
-                <a:spcPct val="90000"/>
-              </a:lnSpc>
-              <a:spcBef>
-                <a:spcPts val="500"/>
-              </a:spcBef>
-              <a:buClr>
-                <a:schemeClr val="accent5"/>
-              </a:buClr>
-              <a:buFont typeface="Wingdings" panose="05000000000000000000" pitchFamily="2" charset="2"/>
-              <a:buChar char="§"/>
-              <a:defRPr sz="2000" kern="1200">
-                <a:solidFill>
-                  <a:schemeClr val="bg1"/>
-                </a:solidFill>
-                <a:latin typeface="+mn-lt"/>
-                <a:ea typeface="+mn-ea"/>
-                <a:cs typeface="+mn-cs"/>
-              </a:defRPr>
-            </a:lvl3pPr>
-            <a:lvl4pPr marL="1600200" indent="-228600" algn="l" defTabSz="914400" rtl="0" eaLnBrk="1" latinLnBrk="0" hangingPunct="1">
-              <a:lnSpc>
-                <a:spcPct val="90000"/>
-              </a:lnSpc>
-              <a:spcBef>
-                <a:spcPts val="500"/>
-              </a:spcBef>
-              <a:buClr>
-                <a:schemeClr val="accent5"/>
-              </a:buClr>
-              <a:buFont typeface="Wingdings" panose="05000000000000000000" pitchFamily="2" charset="2"/>
-              <a:buChar char="§"/>
-              <a:defRPr sz="1800" kern="1200">
-                <a:solidFill>
-                  <a:schemeClr val="bg1"/>
-                </a:solidFill>
-                <a:latin typeface="+mn-lt"/>
-                <a:ea typeface="+mn-ea"/>
-                <a:cs typeface="+mn-cs"/>
-              </a:defRPr>
-            </a:lvl4pPr>
-            <a:lvl5pPr marL="2057400" indent="-228600" algn="l" defTabSz="914400" rtl="0" eaLnBrk="1" latinLnBrk="0" hangingPunct="1">
-              <a:lnSpc>
-                <a:spcPct val="90000"/>
-              </a:lnSpc>
-              <a:spcBef>
-                <a:spcPts val="500"/>
-              </a:spcBef>
-              <a:buClr>
-                <a:schemeClr val="accent5"/>
-              </a:buClr>
-              <a:buFont typeface="Wingdings" panose="05000000000000000000" pitchFamily="2" charset="2"/>
-              <a:buChar char="§"/>
-              <a:defRPr sz="1800" kern="1200">
-                <a:solidFill>
-                  <a:schemeClr val="bg1"/>
-                </a:solidFill>
-                <a:latin typeface="+mn-lt"/>
-                <a:ea typeface="+mn-ea"/>
-                <a:cs typeface="+mn-cs"/>
-              </a:defRPr>
-            </a:lvl5pPr>
-            <a:lvl6pPr marL="2514600" indent="-228600" algn="l" defTabSz="914400" rtl="0" eaLnBrk="1" latinLnBrk="0" hangingPunct="1">
-              <a:lnSpc>
-                <a:spcPct val="90000"/>
-              </a:lnSpc>
-              <a:spcBef>
-                <a:spcPts val="500"/>
-              </a:spcBef>
-              <a:buFont typeface="Arial" panose="020B0604020202020204" pitchFamily="34" charset="0"/>
-              <a:buChar char="•"/>
-              <a:defRPr sz="1800" kern="1200">
-                <a:solidFill>
-                  <a:schemeClr val="tx1"/>
-                </a:solidFill>
-                <a:latin typeface="+mn-lt"/>
-                <a:ea typeface="+mn-ea"/>
-                <a:cs typeface="+mn-cs"/>
-              </a:defRPr>
-            </a:lvl6pPr>
-            <a:lvl7pPr marL="2971800" indent="-228600" algn="l" defTabSz="914400" rtl="0" eaLnBrk="1" latinLnBrk="0" hangingPunct="1">
-              <a:lnSpc>
-                <a:spcPct val="90000"/>
-              </a:lnSpc>
-              <a:spcBef>
-                <a:spcPts val="500"/>
-              </a:spcBef>
-              <a:buFont typeface="Arial" panose="020B0604020202020204" pitchFamily="34" charset="0"/>
-              <a:buChar char="•"/>
-              <a:defRPr sz="1800" kern="1200">
-                <a:solidFill>
-                  <a:schemeClr val="tx1"/>
-                </a:solidFill>
-                <a:latin typeface="+mn-lt"/>
-                <a:ea typeface="+mn-ea"/>
-                <a:cs typeface="+mn-cs"/>
-              </a:defRPr>
-            </a:lvl7pPr>
-            <a:lvl8pPr marL="3429000" indent="-228600" algn="l" defTabSz="914400" rtl="0" eaLnBrk="1" latinLnBrk="0" hangingPunct="1">
-              <a:lnSpc>
-                <a:spcPct val="90000"/>
-              </a:lnSpc>
-              <a:spcBef>
-                <a:spcPts val="500"/>
-              </a:spcBef>
-              <a:buFont typeface="Arial" panose="020B0604020202020204" pitchFamily="34" charset="0"/>
-              <a:buChar char="•"/>
-              <a:defRPr sz="1800" kern="1200">
-                <a:solidFill>
-                  <a:schemeClr val="tx1"/>
-                </a:solidFill>
-                <a:latin typeface="+mn-lt"/>
-                <a:ea typeface="+mn-ea"/>
-                <a:cs typeface="+mn-cs"/>
-              </a:defRPr>
-            </a:lvl8pPr>
-            <a:lvl9pPr marL="3886200" indent="-228600" algn="l" defTabSz="914400" rtl="0" eaLnBrk="1" latinLnBrk="0" hangingPunct="1">
-              <a:lnSpc>
-                <a:spcPct val="90000"/>
-              </a:lnSpc>
-              <a:spcBef>
-                <a:spcPts val="500"/>
-              </a:spcBef>
-              <a:buFont typeface="Arial" panose="020B0604020202020204" pitchFamily="34" charset="0"/>
-              <a:buChar char="•"/>
-              <a:defRPr sz="1800" kern="1200">
-                <a:solidFill>
-                  <a:schemeClr val="tx1"/>
-                </a:solidFill>
-                <a:latin typeface="+mn-lt"/>
-                <a:ea typeface="+mn-ea"/>
-                <a:cs typeface="+mn-cs"/>
-              </a:defRPr>
-            </a:lvl9pPr>
-          </a:lstStyle>
-          <a:p>
-            <a:pPr marL="0" indent="0">
-              <a:buNone/>
-            </a:pPr>
-            <a:r>
-              <a:rPr lang="en-US" dirty="0"/>
-              <a:t>Why?</a:t>
-            </a:r>
-          </a:p>
-        </p:txBody>
-      </p:sp>
-    </p:spTree>
-    <p:extLst>
-      <p:ext uri="{BB962C8B-B14F-4D97-AF65-F5344CB8AC3E}">
-        <p14:creationId xmlns:p14="http://schemas.microsoft.com/office/powerpoint/2010/main" val="2576156856"/>
-      </p:ext>
-    </p:extLst>
-  </p:cSld>
-  <p:clrMapOvr>
-    <a:masterClrMapping/>
-  </p:clrMapOvr>
-</p:sld>
-</file>
-
-<file path=ppt/slides/slide7.xml><?xml version="1.0" encoding="utf-8"?>
 <p:sld xmlns:a="http://schemas.openxmlformats.org/drawingml/2006/main" xmlns:r="http://schemas.openxmlformats.org/officeDocument/2006/relationships" xmlns:p="http://schemas.openxmlformats.org/presentationml/2006/main">
   <p:cSld>
     <p:spTree>
@@ -14284,7 +14454,7 @@
 </p:sld>
 </file>
 
-<file path=ppt/slides/slide8.xml><?xml version="1.0" encoding="utf-8"?>
+<file path=ppt/slides/slide7.xml><?xml version="1.0" encoding="utf-8"?>
 <p:sld xmlns:a="http://schemas.openxmlformats.org/drawingml/2006/main" xmlns:r="http://schemas.openxmlformats.org/officeDocument/2006/relationships" xmlns:p="http://schemas.openxmlformats.org/presentationml/2006/main">
   <p:cSld>
     <p:spTree>
@@ -16583,7 +16753,7 @@
 </p:sld>
 </file>
 
-<file path=ppt/slides/slide9.xml><?xml version="1.0" encoding="utf-8"?>
+<file path=ppt/slides/slide8.xml><?xml version="1.0" encoding="utf-8"?>
 <p:sld xmlns:a="http://schemas.openxmlformats.org/drawingml/2006/main" xmlns:r="http://schemas.openxmlformats.org/officeDocument/2006/relationships" xmlns:p="http://schemas.openxmlformats.org/presentationml/2006/main">
   <p:cSld>
     <p:spTree>
@@ -16965,6 +17135,172 @@
     <p:extLst>
       <p:ext uri="{BB962C8B-B14F-4D97-AF65-F5344CB8AC3E}">
         <p14:creationId xmlns:p14="http://schemas.microsoft.com/office/powerpoint/2010/main" val="2094405024"/>
+      </p:ext>
+    </p:extLst>
+  </p:cSld>
+  <p:clrMapOvr>
+    <a:masterClrMapping/>
+  </p:clrMapOvr>
+</p:sld>
+</file>
+
+<file path=ppt/slides/slide9.xml><?xml version="1.0" encoding="utf-8"?>
+<p:sld xmlns:a="http://schemas.openxmlformats.org/drawingml/2006/main" xmlns:r="http://schemas.openxmlformats.org/officeDocument/2006/relationships" xmlns:p="http://schemas.openxmlformats.org/presentationml/2006/main">
+  <p:cSld>
+    <p:spTree>
+      <p:nvGrpSpPr>
+        <p:cNvPr id="1" name=""/>
+        <p:cNvGrpSpPr/>
+        <p:nvPr/>
+      </p:nvGrpSpPr>
+      <p:grpSpPr>
+        <a:xfrm>
+          <a:off x="0" y="0"/>
+          <a:ext cx="0" cy="0"/>
+          <a:chOff x="0" y="0"/>
+          <a:chExt cx="0" cy="0"/>
+        </a:xfrm>
+      </p:grpSpPr>
+      <p:sp>
+        <p:nvSpPr>
+          <p:cNvPr id="2" name="Title 1">
+            <a:extLst>
+              <a:ext uri="{FF2B5EF4-FFF2-40B4-BE49-F238E27FC236}">
+                <a16:creationId xmlns:a16="http://schemas.microsoft.com/office/drawing/2014/main" id="{6C14B5D2-8D31-4D6C-B863-E5FA61A0FA35}"/>
+              </a:ext>
+            </a:extLst>
+          </p:cNvPr>
+          <p:cNvSpPr>
+            <a:spLocks noGrp="1"/>
+          </p:cNvSpPr>
+          <p:nvPr>
+            <p:ph type="title"/>
+          </p:nvPr>
+        </p:nvSpPr>
+        <p:spPr/>
+        <p:txBody>
+          <a:bodyPr/>
+          <a:lstStyle/>
+          <a:p>
+            <a:r>
+              <a:rPr lang="en-MY" dirty="0"/>
+              <a:t>Restoring previous versions</a:t>
+            </a:r>
+          </a:p>
+        </p:txBody>
+      </p:sp>
+      <p:pic>
+        <p:nvPicPr>
+          <p:cNvPr id="4" name="Picture 3" descr="Text&#10;&#10;Description automatically generated">
+            <a:extLst>
+              <a:ext uri="{FF2B5EF4-FFF2-40B4-BE49-F238E27FC236}">
+                <a16:creationId xmlns:a16="http://schemas.microsoft.com/office/drawing/2014/main" id="{0339B361-A173-4F78-992D-90F084E78421}"/>
+              </a:ext>
+            </a:extLst>
+          </p:cNvPr>
+          <p:cNvPicPr>
+            <a:picLocks noChangeAspect="1"/>
+          </p:cNvPicPr>
+          <p:nvPr/>
+        </p:nvPicPr>
+        <p:blipFill>
+          <a:blip r:embed="rId2"/>
+          <a:stretch>
+            <a:fillRect/>
+          </a:stretch>
+        </p:blipFill>
+        <p:spPr>
+          <a:xfrm>
+            <a:off x="101024" y="1114165"/>
+            <a:ext cx="8774070" cy="5583499"/>
+          </a:xfrm>
+          <a:prstGeom prst="rect">
+            <a:avLst/>
+          </a:prstGeom>
+        </p:spPr>
+      </p:pic>
+      <p:sp>
+        <p:nvSpPr>
+          <p:cNvPr id="6" name="Content Placeholder 2">
+            <a:extLst>
+              <a:ext uri="{FF2B5EF4-FFF2-40B4-BE49-F238E27FC236}">
+                <a16:creationId xmlns:a16="http://schemas.microsoft.com/office/drawing/2014/main" id="{270D1C7C-ABDA-4EBB-8817-EA6FFCB6E15A}"/>
+              </a:ext>
+            </a:extLst>
+          </p:cNvPr>
+          <p:cNvSpPr>
+            <a:spLocks noGrp="1"/>
+          </p:cNvSpPr>
+          <p:nvPr>
+            <p:ph idx="1"/>
+          </p:nvPr>
+        </p:nvSpPr>
+        <p:spPr>
+          <a:xfrm>
+            <a:off x="8531440" y="1819921"/>
+            <a:ext cx="3018409" cy="4357041"/>
+          </a:xfrm>
+        </p:spPr>
+        <p:txBody>
+          <a:bodyPr/>
+          <a:lstStyle/>
+          <a:p>
+            <a:r>
+              <a:rPr lang="en-US" sz="2400" dirty="0"/>
+              <a:t>Several methods to restore previous versions</a:t>
+            </a:r>
+          </a:p>
+          <a:p>
+            <a:pPr marL="457200" indent="-457200">
+              <a:buAutoNum type="arabicParenR"/>
+            </a:pPr>
+            <a:r>
+              <a:rPr lang="en-US" sz="2400" dirty="0"/>
+              <a:t>git checkout</a:t>
+            </a:r>
+          </a:p>
+          <a:p>
+            <a:pPr marL="457200" indent="-457200">
+              <a:buAutoNum type="arabicParenR"/>
+            </a:pPr>
+            <a:r>
+              <a:rPr lang="en-US" sz="2400" dirty="0"/>
+              <a:t>git reset</a:t>
+            </a:r>
+          </a:p>
+          <a:p>
+            <a:pPr marL="457200" indent="-457200">
+              <a:buAutoNum type="arabicParenR"/>
+            </a:pPr>
+            <a:r>
+              <a:rPr lang="en-US" sz="2400" dirty="0"/>
+              <a:t>git revert</a:t>
+            </a:r>
+          </a:p>
+          <a:p>
+            <a:pPr marL="457200" indent="-457200">
+              <a:buAutoNum type="arabicParenR"/>
+            </a:pPr>
+            <a:r>
+              <a:rPr lang="en-US" sz="2400" dirty="0"/>
+              <a:t>git restore</a:t>
+            </a:r>
+          </a:p>
+          <a:p>
+            <a:pPr marL="457200" indent="-457200">
+              <a:buAutoNum type="arabicParenR"/>
+            </a:pPr>
+            <a:endParaRPr lang="en-US" sz="2400" dirty="0"/>
+          </a:p>
+          <a:p>
+            <a:endParaRPr lang="en-US" dirty="0"/>
+          </a:p>
+        </p:txBody>
+      </p:sp>
+    </p:spTree>
+    <p:extLst>
+      <p:ext uri="{BB962C8B-B14F-4D97-AF65-F5344CB8AC3E}">
+        <p14:creationId xmlns:p14="http://schemas.microsoft.com/office/powerpoint/2010/main" val="639973640"/>
       </p:ext>
     </p:extLst>
   </p:cSld>
@@ -17766,14 +18102,6 @@
 </file>
 
 <file path=customXml/item1.xml><?xml version="1.0" encoding="utf-8"?>
-<p:properties xmlns:p="http://schemas.microsoft.com/office/2006/metadata/properties" xmlns:xsi="http://www.w3.org/2001/XMLSchema-instance" xmlns:pc="http://schemas.microsoft.com/office/infopath/2007/PartnerControls">
-  <documentManagement>
-    <MediaServiceKeyPoints xmlns="71af3243-3dd4-4a8d-8c0d-dd76da1f02a5" xsi:nil="true"/>
-  </documentManagement>
-</p:properties>
-</file>
-
-<file path=customXml/item2.xml><?xml version="1.0" encoding="utf-8"?>
 <ct:contentTypeSchema xmlns:ct="http://schemas.microsoft.com/office/2006/metadata/contentType" xmlns:ma="http://schemas.microsoft.com/office/2006/metadata/properties/metaAttributes" ct:_="" ma:_="" ma:contentTypeName="Document" ma:contentTypeID="0x01010079F111ED35F8CC479449609E8A0923A6" ma:contentTypeVersion="11" ma:contentTypeDescription="Create a new document." ma:contentTypeScope="" ma:versionID="96291512c1ee715ab617f4c07df79fc1">
   <xsd:schema xmlns:xsd="http://www.w3.org/2001/XMLSchema" xmlns:xs="http://www.w3.org/2001/XMLSchema" xmlns:p="http://schemas.microsoft.com/office/2006/metadata/properties" xmlns:ns2="71af3243-3dd4-4a8d-8c0d-dd76da1f02a5" xmlns:ns3="16c05727-aa75-4e4a-9b5f-8a80a1165891" targetNamespace="http://schemas.microsoft.com/office/2006/metadata/properties" ma:root="true" ma:fieldsID="8256c27c40ca5c40ce1cf6c44f0205df" ns2:_="" ns3:_="">
     <xsd:import namespace="71af3243-3dd4-4a8d-8c0d-dd76da1f02a5"/>
@@ -17984,6 +18312,14 @@
 </ct:contentTypeSchema>
 </file>
 
+<file path=customXml/item2.xml><?xml version="1.0" encoding="utf-8"?>
+<p:properties xmlns:p="http://schemas.microsoft.com/office/2006/metadata/properties" xmlns:xsi="http://www.w3.org/2001/XMLSchema-instance" xmlns:pc="http://schemas.microsoft.com/office/infopath/2007/PartnerControls">
+  <documentManagement>
+    <MediaServiceKeyPoints xmlns="71af3243-3dd4-4a8d-8c0d-dd76da1f02a5" xsi:nil="true"/>
+  </documentManagement>
+</p:properties>
+</file>
+
 <file path=customXml/item3.xml><?xml version="1.0" encoding="utf-8"?>
 <?mso-contentType ?>
 <FormTemplates xmlns="http://schemas.microsoft.com/sharepoint/v3/contenttype/forms">
@@ -17994,16 +18330,6 @@
 </file>
 
 <file path=customXml/itemProps1.xml><?xml version="1.0" encoding="utf-8"?>
-<ds:datastoreItem xmlns:ds="http://schemas.openxmlformats.org/officeDocument/2006/customXml" ds:itemID="{1E159ADF-C50B-4A45-AD13-B0A8152C3150}">
-  <ds:schemaRefs>
-    <ds:schemaRef ds:uri="http://schemas.microsoft.com/office/2006/metadata/properties"/>
-    <ds:schemaRef ds:uri="http://schemas.microsoft.com/office/infopath/2007/PartnerControls"/>
-    <ds:schemaRef ds:uri="71af3243-3dd4-4a8d-8c0d-dd76da1f02a5"/>
-  </ds:schemaRefs>
-</ds:datastoreItem>
-</file>
-
-<file path=customXml/itemProps2.xml><?xml version="1.0" encoding="utf-8"?>
 <ds:datastoreItem xmlns:ds="http://schemas.openxmlformats.org/officeDocument/2006/customXml" ds:itemID="{95FDF6E3-4638-4FD3-B9D7-E0E63F20565C}">
   <ds:schemaRefs>
     <ds:schemaRef ds:uri="http://schemas.microsoft.com/office/2006/metadata/contentType"/>
@@ -18022,6 +18348,16 @@
 </ds:datastoreItem>
 </file>
 
+<file path=customXml/itemProps2.xml><?xml version="1.0" encoding="utf-8"?>
+<ds:datastoreItem xmlns:ds="http://schemas.openxmlformats.org/officeDocument/2006/customXml" ds:itemID="{1E159ADF-C50B-4A45-AD13-B0A8152C3150}">
+  <ds:schemaRefs>
+    <ds:schemaRef ds:uri="http://schemas.microsoft.com/office/2006/metadata/properties"/>
+    <ds:schemaRef ds:uri="http://schemas.microsoft.com/office/infopath/2007/PartnerControls"/>
+    <ds:schemaRef ds:uri="71af3243-3dd4-4a8d-8c0d-dd76da1f02a5"/>
+  </ds:schemaRefs>
+</ds:datastoreItem>
+</file>
+
 <file path=customXml/itemProps3.xml><?xml version="1.0" encoding="utf-8"?>
 <ds:datastoreItem xmlns:ds="http://schemas.openxmlformats.org/officeDocument/2006/customXml" ds:itemID="{EEDC6638-3F1D-4CA5-A167-2F719C08762F}">
   <ds:schemaRefs>

</xml_diff>

<commit_message>
Added slides on push and pull
</commit_message>
<xml_diff>
--- a/Git and Github.pptx
+++ b/Git and Github.pptx
@@ -7843,10 +7843,10 @@
       </p:sp>
       <p:pic>
         <p:nvPicPr>
-          <p:cNvPr id="6" name="Picture 5" descr="Text&#10;&#10;Description automatically generated">
-            <a:extLst>
-              <a:ext uri="{FF2B5EF4-FFF2-40B4-BE49-F238E27FC236}">
-                <a16:creationId xmlns:a16="http://schemas.microsoft.com/office/drawing/2014/main" id="{CDA35CE7-C8BE-45CA-83A8-EF804743D9A8}"/>
+          <p:cNvPr id="8" name="Picture 7" descr="Text&#10;&#10;Description automatically generated">
+            <a:extLst>
+              <a:ext uri="{FF2B5EF4-FFF2-40B4-BE49-F238E27FC236}">
+                <a16:creationId xmlns:a16="http://schemas.microsoft.com/office/drawing/2014/main" id="{E93962E7-466C-4B3E-AFA9-545F232B1927}"/>
               </a:ext>
             </a:extLst>
           </p:cNvPr>
@@ -7863,8 +7863,8 @@
         </p:blipFill>
         <p:spPr>
           <a:xfrm>
-            <a:off x="-133166" y="3613079"/>
-            <a:ext cx="7892249" cy="3671325"/>
+            <a:off x="78143" y="3650516"/>
+            <a:ext cx="8256233" cy="3533287"/>
           </a:xfrm>
           <a:prstGeom prst="rect">
             <a:avLst/>
@@ -7979,10 +7979,10 @@
       </p:sp>
       <p:pic>
         <p:nvPicPr>
-          <p:cNvPr id="8" name="Picture 7" descr="Text&#10;&#10;Description automatically generated">
-            <a:extLst>
-              <a:ext uri="{FF2B5EF4-FFF2-40B4-BE49-F238E27FC236}">
-                <a16:creationId xmlns:a16="http://schemas.microsoft.com/office/drawing/2014/main" id="{AC70B88C-CCCD-47D4-9D19-8C49BDEECB2E}"/>
+          <p:cNvPr id="5" name="Picture 4" descr="Graphical user interface, text&#10;&#10;Description automatically generated">
+            <a:extLst>
+              <a:ext uri="{FF2B5EF4-FFF2-40B4-BE49-F238E27FC236}">
+                <a16:creationId xmlns:a16="http://schemas.microsoft.com/office/drawing/2014/main" id="{7962B4B9-8D8A-42AF-9521-CBBFE0D416F7}"/>
               </a:ext>
             </a:extLst>
           </p:cNvPr>
@@ -7999,8 +7999,8 @@
         </p:blipFill>
         <p:spPr>
           <a:xfrm>
-            <a:off x="-123923" y="3062797"/>
-            <a:ext cx="8494129" cy="3724239"/>
+            <a:off x="0" y="3594933"/>
+            <a:ext cx="10289219" cy="2900753"/>
           </a:xfrm>
           <a:prstGeom prst="rect">
             <a:avLst/>
@@ -18102,6 +18102,14 @@
 </file>
 
 <file path=customXml/item1.xml><?xml version="1.0" encoding="utf-8"?>
+<p:properties xmlns:p="http://schemas.microsoft.com/office/2006/metadata/properties" xmlns:xsi="http://www.w3.org/2001/XMLSchema-instance" xmlns:pc="http://schemas.microsoft.com/office/infopath/2007/PartnerControls">
+  <documentManagement>
+    <MediaServiceKeyPoints xmlns="71af3243-3dd4-4a8d-8c0d-dd76da1f02a5" xsi:nil="true"/>
+  </documentManagement>
+</p:properties>
+</file>
+
+<file path=customXml/item2.xml><?xml version="1.0" encoding="utf-8"?>
 <ct:contentTypeSchema xmlns:ct="http://schemas.microsoft.com/office/2006/metadata/contentType" xmlns:ma="http://schemas.microsoft.com/office/2006/metadata/properties/metaAttributes" ct:_="" ma:_="" ma:contentTypeName="Document" ma:contentTypeID="0x01010079F111ED35F8CC479449609E8A0923A6" ma:contentTypeVersion="11" ma:contentTypeDescription="Create a new document." ma:contentTypeScope="" ma:versionID="96291512c1ee715ab617f4c07df79fc1">
   <xsd:schema xmlns:xsd="http://www.w3.org/2001/XMLSchema" xmlns:xs="http://www.w3.org/2001/XMLSchema" xmlns:p="http://schemas.microsoft.com/office/2006/metadata/properties" xmlns:ns2="71af3243-3dd4-4a8d-8c0d-dd76da1f02a5" xmlns:ns3="16c05727-aa75-4e4a-9b5f-8a80a1165891" targetNamespace="http://schemas.microsoft.com/office/2006/metadata/properties" ma:root="true" ma:fieldsID="8256c27c40ca5c40ce1cf6c44f0205df" ns2:_="" ns3:_="">
     <xsd:import namespace="71af3243-3dd4-4a8d-8c0d-dd76da1f02a5"/>
@@ -18312,14 +18320,6 @@
 </ct:contentTypeSchema>
 </file>
 
-<file path=customXml/item2.xml><?xml version="1.0" encoding="utf-8"?>
-<p:properties xmlns:p="http://schemas.microsoft.com/office/2006/metadata/properties" xmlns:xsi="http://www.w3.org/2001/XMLSchema-instance" xmlns:pc="http://schemas.microsoft.com/office/infopath/2007/PartnerControls">
-  <documentManagement>
-    <MediaServiceKeyPoints xmlns="71af3243-3dd4-4a8d-8c0d-dd76da1f02a5" xsi:nil="true"/>
-  </documentManagement>
-</p:properties>
-</file>
-
 <file path=customXml/item3.xml><?xml version="1.0" encoding="utf-8"?>
 <?mso-contentType ?>
 <FormTemplates xmlns="http://schemas.microsoft.com/sharepoint/v3/contenttype/forms">
@@ -18330,6 +18330,16 @@
 </file>
 
 <file path=customXml/itemProps1.xml><?xml version="1.0" encoding="utf-8"?>
+<ds:datastoreItem xmlns:ds="http://schemas.openxmlformats.org/officeDocument/2006/customXml" ds:itemID="{1E159ADF-C50B-4A45-AD13-B0A8152C3150}">
+  <ds:schemaRefs>
+    <ds:schemaRef ds:uri="http://schemas.microsoft.com/office/2006/metadata/properties"/>
+    <ds:schemaRef ds:uri="http://schemas.microsoft.com/office/infopath/2007/PartnerControls"/>
+    <ds:schemaRef ds:uri="71af3243-3dd4-4a8d-8c0d-dd76da1f02a5"/>
+  </ds:schemaRefs>
+</ds:datastoreItem>
+</file>
+
+<file path=customXml/itemProps2.xml><?xml version="1.0" encoding="utf-8"?>
 <ds:datastoreItem xmlns:ds="http://schemas.openxmlformats.org/officeDocument/2006/customXml" ds:itemID="{95FDF6E3-4638-4FD3-B9D7-E0E63F20565C}">
   <ds:schemaRefs>
     <ds:schemaRef ds:uri="http://schemas.microsoft.com/office/2006/metadata/contentType"/>
@@ -18348,16 +18358,6 @@
 </ds:datastoreItem>
 </file>
 
-<file path=customXml/itemProps2.xml><?xml version="1.0" encoding="utf-8"?>
-<ds:datastoreItem xmlns:ds="http://schemas.openxmlformats.org/officeDocument/2006/customXml" ds:itemID="{1E159ADF-C50B-4A45-AD13-B0A8152C3150}">
-  <ds:schemaRefs>
-    <ds:schemaRef ds:uri="http://schemas.microsoft.com/office/2006/metadata/properties"/>
-    <ds:schemaRef ds:uri="http://schemas.microsoft.com/office/infopath/2007/PartnerControls"/>
-    <ds:schemaRef ds:uri="71af3243-3dd4-4a8d-8c0d-dd76da1f02a5"/>
-  </ds:schemaRefs>
-</ds:datastoreItem>
-</file>
-
 <file path=customXml/itemProps3.xml><?xml version="1.0" encoding="utf-8"?>
 <ds:datastoreItem xmlns:ds="http://schemas.openxmlformats.org/officeDocument/2006/customXml" ds:itemID="{EEDC6638-3F1D-4CA5-A167-2F719C08762F}">
   <ds:schemaRefs>

</xml_diff>